<commit_message>
Add troubleshooting section to powerpoint
</commit_message>
<xml_diff>
--- a/handson_workshop.pptx
+++ b/handson_workshop.pptx
@@ -34,6 +34,13 @@
     <p:sldId id="288" r:id="rId28"/>
     <p:sldId id="289" r:id="rId29"/>
     <p:sldId id="290" r:id="rId30"/>
+    <p:sldId id="291" r:id="rId31"/>
+    <p:sldId id="292" r:id="rId32"/>
+    <p:sldId id="293" r:id="rId33"/>
+    <p:sldId id="295" r:id="rId34"/>
+    <p:sldId id="297" r:id="rId35"/>
+    <p:sldId id="296" r:id="rId36"/>
+    <p:sldId id="298" r:id="rId37"/>
   </p:sldIdLst>
   <p:sldSz cx="12192000" cy="6858000"/>
   <p:notesSz cx="6858000" cy="9144000"/>
@@ -133,14 +140,6 @@
     </a:lvl9pPr>
   </p:defaultTextStyle>
 </p:presentation>
-</file>
-
-<file path=ppt/revisionInfo.xml><?xml version="1.0" encoding="utf-8"?>
-<p1510:revInfo xmlns:a="http://schemas.openxmlformats.org/drawingml/2006/main" xmlns:r="http://schemas.openxmlformats.org/officeDocument/2006/relationships" xmlns:p1510="http://schemas.microsoft.com/office/powerpoint/2015/10/main">
-  <p1510:revLst>
-    <p1510:client id="{EFDECDAA-DE9C-419F-B084-DC321414B3E6}" v="814" dt="2019-06-07T12:26:18.556"/>
-  </p1510:revLst>
-</p1510:revInfo>
 </file>
 
 <file path=ppt/diagrams/colors1.xml><?xml version="1.0" encoding="utf-8"?>
@@ -25936,6 +25935,1932 @@
 </p:sld>
 </file>
 
+<file path=ppt/slides/slide30.xml><?xml version="1.0" encoding="utf-8"?>
+<p:sld xmlns:a="http://schemas.openxmlformats.org/drawingml/2006/main" xmlns:r="http://schemas.openxmlformats.org/officeDocument/2006/relationships" xmlns:p="http://schemas.openxmlformats.org/presentationml/2006/main">
+  <p:cSld>
+    <p:spTree>
+      <p:nvGrpSpPr>
+        <p:cNvPr id="1" name=""/>
+        <p:cNvGrpSpPr/>
+        <p:nvPr/>
+      </p:nvGrpSpPr>
+      <p:grpSpPr>
+        <a:xfrm>
+          <a:off x="0" y="0"/>
+          <a:ext cx="0" cy="0"/>
+          <a:chOff x="0" y="0"/>
+          <a:chExt cx="0" cy="0"/>
+        </a:xfrm>
+      </p:grpSpPr>
+      <p:sp>
+        <p:nvSpPr>
+          <p:cNvPr id="2" name="Titel 1">
+            <a:extLst>
+              <a:ext uri="{FF2B5EF4-FFF2-40B4-BE49-F238E27FC236}">
+                <a16:creationId xmlns:a16="http://schemas.microsoft.com/office/drawing/2014/main" id="{B8B33574-343C-4C95-9293-6C654ABF38BC}"/>
+              </a:ext>
+            </a:extLst>
+          </p:cNvPr>
+          <p:cNvSpPr>
+            <a:spLocks noGrp="1"/>
+          </p:cNvSpPr>
+          <p:nvPr>
+            <p:ph type="title"/>
+          </p:nvPr>
+        </p:nvSpPr>
+        <p:spPr/>
+        <p:txBody>
+          <a:bodyPr/>
+          <a:lstStyle/>
+          <a:p>
+            <a:r>
+              <a:rPr lang="de-DE" dirty="0"/>
+              <a:t>Appendix: Troubleshooting</a:t>
+            </a:r>
+            <a:endParaRPr lang="en-US" dirty="0"/>
+          </a:p>
+        </p:txBody>
+      </p:sp>
+      <p:sp>
+        <p:nvSpPr>
+          <p:cNvPr id="3" name="Textplatzhalter 2">
+            <a:extLst>
+              <a:ext uri="{FF2B5EF4-FFF2-40B4-BE49-F238E27FC236}">
+                <a16:creationId xmlns:a16="http://schemas.microsoft.com/office/drawing/2014/main" id="{D31B7533-6BFC-4DAE-8A34-6A86CABCA86F}"/>
+              </a:ext>
+            </a:extLst>
+          </p:cNvPr>
+          <p:cNvSpPr>
+            <a:spLocks noGrp="1"/>
+          </p:cNvSpPr>
+          <p:nvPr>
+            <p:ph type="body" idx="1"/>
+          </p:nvPr>
+        </p:nvSpPr>
+        <p:spPr/>
+        <p:txBody>
+          <a:bodyPr/>
+          <a:lstStyle/>
+          <a:p>
+            <a:r>
+              <a:rPr lang="de-DE" dirty="0"/>
+              <a:t>Norton Security / Docker Settings</a:t>
+            </a:r>
+            <a:endParaRPr lang="en-US" dirty="0"/>
+          </a:p>
+        </p:txBody>
+      </p:sp>
+    </p:spTree>
+    <p:extLst>
+      <p:ext uri="{BB962C8B-B14F-4D97-AF65-F5344CB8AC3E}">
+        <p14:creationId xmlns:p14="http://schemas.microsoft.com/office/powerpoint/2010/main" val="831476598"/>
+      </p:ext>
+    </p:extLst>
+  </p:cSld>
+  <p:clrMapOvr>
+    <a:masterClrMapping/>
+  </p:clrMapOvr>
+</p:sld>
+</file>
+
+<file path=ppt/slides/slide31.xml><?xml version="1.0" encoding="utf-8"?>
+<p:sld xmlns:a="http://schemas.openxmlformats.org/drawingml/2006/main" xmlns:r="http://schemas.openxmlformats.org/officeDocument/2006/relationships" xmlns:p="http://schemas.openxmlformats.org/presentationml/2006/main">
+  <p:cSld>
+    <p:spTree>
+      <p:nvGrpSpPr>
+        <p:cNvPr id="1" name=""/>
+        <p:cNvGrpSpPr/>
+        <p:nvPr/>
+      </p:nvGrpSpPr>
+      <p:grpSpPr>
+        <a:xfrm>
+          <a:off x="0" y="0"/>
+          <a:ext cx="0" cy="0"/>
+          <a:chOff x="0" y="0"/>
+          <a:chExt cx="0" cy="0"/>
+        </a:xfrm>
+      </p:grpSpPr>
+      <p:sp>
+        <p:nvSpPr>
+          <p:cNvPr id="3" name="Inhaltsplatzhalter 2">
+            <a:extLst>
+              <a:ext uri="{FF2B5EF4-FFF2-40B4-BE49-F238E27FC236}">
+                <a16:creationId xmlns:a16="http://schemas.microsoft.com/office/drawing/2014/main" id="{2E6429AE-1593-4842-86AE-D92C0ED8B22D}"/>
+              </a:ext>
+            </a:extLst>
+          </p:cNvPr>
+          <p:cNvSpPr>
+            <a:spLocks noGrp="1"/>
+          </p:cNvSpPr>
+          <p:nvPr>
+            <p:ph idx="1"/>
+          </p:nvPr>
+        </p:nvSpPr>
+        <p:spPr>
+          <a:xfrm>
+            <a:off x="838200" y="1825624"/>
+            <a:ext cx="10515600" cy="4879975"/>
+          </a:xfrm>
+        </p:spPr>
+        <p:txBody>
+          <a:bodyPr>
+            <a:normAutofit/>
+          </a:bodyPr>
+          <a:lstStyle/>
+          <a:p>
+            <a:r>
+              <a:rPr lang="de-DE" sz="2400" dirty="0"/>
+              <a:t>Mit user-Admin </a:t>
+            </a:r>
+            <a:r>
+              <a:rPr lang="de-DE" sz="2400" dirty="0" err="1"/>
+              <a:t>account</a:t>
+            </a:r>
+            <a:r>
+              <a:rPr lang="de-DE" sz="2400" dirty="0"/>
+              <a:t> anmelden</a:t>
+            </a:r>
+          </a:p>
+          <a:p>
+            <a:r>
+              <a:rPr lang="de-DE" sz="2400" dirty="0"/>
+              <a:t>Norton Security öffnen</a:t>
+            </a:r>
+          </a:p>
+          <a:p>
+            <a:r>
+              <a:rPr lang="de-DE" sz="2400" dirty="0"/>
+              <a:t>Einstellungen wählen</a:t>
+            </a:r>
+          </a:p>
+          <a:p>
+            <a:r>
+              <a:rPr lang="en-US" sz="2400" dirty="0"/>
+              <a:t>Firewall </a:t>
+            </a:r>
+            <a:r>
+              <a:rPr lang="en-US" sz="2400" dirty="0" err="1"/>
+              <a:t>Einstellungen</a:t>
+            </a:r>
+            <a:r>
+              <a:rPr lang="en-US" sz="2400" dirty="0"/>
+              <a:t> </a:t>
+            </a:r>
+            <a:r>
+              <a:rPr lang="en-US" sz="2400" dirty="0" err="1"/>
+              <a:t>öffnen</a:t>
+            </a:r>
+            <a:endParaRPr lang="en-US" sz="2400" dirty="0"/>
+          </a:p>
+        </p:txBody>
+      </p:sp>
+      <p:sp>
+        <p:nvSpPr>
+          <p:cNvPr id="2" name="Titel 1">
+            <a:extLst>
+              <a:ext uri="{FF2B5EF4-FFF2-40B4-BE49-F238E27FC236}">
+                <a16:creationId xmlns:a16="http://schemas.microsoft.com/office/drawing/2014/main" id="{DB8D5029-1223-4C9E-9BB1-52F91CFADFA1}"/>
+              </a:ext>
+            </a:extLst>
+          </p:cNvPr>
+          <p:cNvSpPr>
+            <a:spLocks noGrp="1"/>
+          </p:cNvSpPr>
+          <p:nvPr>
+            <p:ph type="title"/>
+          </p:nvPr>
+        </p:nvSpPr>
+        <p:spPr/>
+        <p:txBody>
+          <a:bodyPr/>
+          <a:lstStyle/>
+          <a:p>
+            <a:pPr lvl="0"/>
+            <a:r>
+              <a:rPr lang="de-DE" dirty="0"/>
+              <a:t>Ausnahmeregel für Firewall hinzufügen</a:t>
+            </a:r>
+            <a:endParaRPr lang="en-US" dirty="0"/>
+          </a:p>
+        </p:txBody>
+      </p:sp>
+      <p:pic>
+        <p:nvPicPr>
+          <p:cNvPr id="5" name="Grafik 4" descr="Ein Bild, das Screenshot enthält.&#10;&#10;Automatisch generierte Beschreibung">
+            <a:extLst>
+              <a:ext uri="{FF2B5EF4-FFF2-40B4-BE49-F238E27FC236}">
+                <a16:creationId xmlns:a16="http://schemas.microsoft.com/office/drawing/2014/main" id="{9E4A25A6-61DB-4CA9-A562-05282F2CF682}"/>
+              </a:ext>
+            </a:extLst>
+          </p:cNvPr>
+          <p:cNvPicPr>
+            <a:picLocks noChangeAspect="1"/>
+          </p:cNvPicPr>
+          <p:nvPr/>
+        </p:nvPicPr>
+        <p:blipFill rotWithShape="1">
+          <a:blip r:embed="rId2">
+            <a:extLst>
+              <a:ext uri="{28A0092B-C50C-407E-A947-70E740481C1C}">
+                <a14:useLocalDpi xmlns:a14="http://schemas.microsoft.com/office/drawing/2010/main" val="0"/>
+              </a:ext>
+            </a:extLst>
+          </a:blip>
+          <a:srcRect l="45192" t="7509" r="14227" b="88088"/>
+          <a:stretch/>
+        </p:blipFill>
+        <p:spPr>
+          <a:xfrm>
+            <a:off x="3999123" y="2864385"/>
+            <a:ext cx="3471525" cy="269713"/>
+          </a:xfrm>
+          <a:prstGeom prst="rect">
+            <a:avLst/>
+          </a:prstGeom>
+        </p:spPr>
+      </p:pic>
+      <p:pic>
+        <p:nvPicPr>
+          <p:cNvPr id="10" name="Grafik 9" descr="Ein Bild, das Screenshot enthält.&#10;&#10;Automatisch generierte Beschreibung">
+            <a:extLst>
+              <a:ext uri="{FF2B5EF4-FFF2-40B4-BE49-F238E27FC236}">
+                <a16:creationId xmlns:a16="http://schemas.microsoft.com/office/drawing/2014/main" id="{DC0EDC47-D9A6-49DE-B997-8E687F893755}"/>
+              </a:ext>
+            </a:extLst>
+          </p:cNvPr>
+          <p:cNvPicPr>
+            <a:picLocks noChangeAspect="1"/>
+          </p:cNvPicPr>
+          <p:nvPr/>
+        </p:nvPicPr>
+        <p:blipFill rotWithShape="1">
+          <a:blip r:embed="rId2">
+            <a:extLst>
+              <a:ext uri="{28A0092B-C50C-407E-A947-70E740481C1C}">
+                <a14:useLocalDpi xmlns:a14="http://schemas.microsoft.com/office/drawing/2010/main" val="0"/>
+              </a:ext>
+            </a:extLst>
+          </a:blip>
+          <a:srcRect l="15315" t="28957" r="33430" b="25360"/>
+          <a:stretch/>
+        </p:blipFill>
+        <p:spPr>
+          <a:xfrm>
+            <a:off x="1233888" y="3646984"/>
+            <a:ext cx="4384714" cy="2798284"/>
+          </a:xfrm>
+          <a:prstGeom prst="rect">
+            <a:avLst/>
+          </a:prstGeom>
+        </p:spPr>
+      </p:pic>
+      <p:sp>
+        <p:nvSpPr>
+          <p:cNvPr id="11" name="Rechteck: abgerundete Ecken 10">
+            <a:extLst>
+              <a:ext uri="{FF2B5EF4-FFF2-40B4-BE49-F238E27FC236}">
+                <a16:creationId xmlns:a16="http://schemas.microsoft.com/office/drawing/2014/main" id="{7254EB64-7B1C-4FFB-BDBA-791DE02886BC}"/>
+              </a:ext>
+            </a:extLst>
+          </p:cNvPr>
+          <p:cNvSpPr/>
+          <p:nvPr/>
+        </p:nvSpPr>
+        <p:spPr>
+          <a:xfrm>
+            <a:off x="1255923" y="4417764"/>
+            <a:ext cx="2192357" cy="757740"/>
+          </a:xfrm>
+          <a:prstGeom prst="roundRect">
+            <a:avLst/>
+          </a:prstGeom>
+          <a:noFill/>
+          <a:ln w="38100">
+            <a:solidFill>
+              <a:srgbClr val="FF0000"/>
+            </a:solidFill>
+          </a:ln>
+        </p:spPr>
+        <p:style>
+          <a:lnRef idx="2">
+            <a:schemeClr val="accent1">
+              <a:shade val="50000"/>
+            </a:schemeClr>
+          </a:lnRef>
+          <a:fillRef idx="1">
+            <a:schemeClr val="accent1"/>
+          </a:fillRef>
+          <a:effectRef idx="0">
+            <a:schemeClr val="accent1"/>
+          </a:effectRef>
+          <a:fontRef idx="minor">
+            <a:schemeClr val="lt1"/>
+          </a:fontRef>
+        </p:style>
+        <p:txBody>
+          <a:bodyPr rtlCol="0" anchor="ctr"/>
+          <a:lstStyle/>
+          <a:p>
+            <a:pPr algn="ctr"/>
+            <a:endParaRPr lang="en-US"/>
+          </a:p>
+        </p:txBody>
+      </p:sp>
+      <p:sp>
+        <p:nvSpPr>
+          <p:cNvPr id="12" name="Rechteck: abgerundete Ecken 11">
+            <a:extLst>
+              <a:ext uri="{FF2B5EF4-FFF2-40B4-BE49-F238E27FC236}">
+                <a16:creationId xmlns:a16="http://schemas.microsoft.com/office/drawing/2014/main" id="{AAD11C3F-5542-4538-BC2F-75EBA70B101D}"/>
+              </a:ext>
+            </a:extLst>
+          </p:cNvPr>
+          <p:cNvSpPr/>
+          <p:nvPr/>
+        </p:nvSpPr>
+        <p:spPr>
+          <a:xfrm>
+            <a:off x="5221371" y="2823202"/>
+            <a:ext cx="987405" cy="310896"/>
+          </a:xfrm>
+          <a:prstGeom prst="roundRect">
+            <a:avLst/>
+          </a:prstGeom>
+          <a:noFill/>
+          <a:ln w="38100">
+            <a:solidFill>
+              <a:srgbClr val="FF0000"/>
+            </a:solidFill>
+          </a:ln>
+        </p:spPr>
+        <p:style>
+          <a:lnRef idx="2">
+            <a:schemeClr val="accent1">
+              <a:shade val="50000"/>
+            </a:schemeClr>
+          </a:lnRef>
+          <a:fillRef idx="1">
+            <a:schemeClr val="accent1"/>
+          </a:fillRef>
+          <a:effectRef idx="0">
+            <a:schemeClr val="accent1"/>
+          </a:effectRef>
+          <a:fontRef idx="minor">
+            <a:schemeClr val="lt1"/>
+          </a:fontRef>
+        </p:style>
+        <p:txBody>
+          <a:bodyPr rtlCol="0" anchor="ctr"/>
+          <a:lstStyle/>
+          <a:p>
+            <a:pPr algn="ctr"/>
+            <a:endParaRPr lang="en-US"/>
+          </a:p>
+        </p:txBody>
+      </p:sp>
+    </p:spTree>
+    <p:extLst>
+      <p:ext uri="{BB962C8B-B14F-4D97-AF65-F5344CB8AC3E}">
+        <p14:creationId xmlns:p14="http://schemas.microsoft.com/office/powerpoint/2010/main" val="3035544034"/>
+      </p:ext>
+    </p:extLst>
+  </p:cSld>
+  <p:clrMapOvr>
+    <a:masterClrMapping/>
+  </p:clrMapOvr>
+</p:sld>
+</file>
+
+<file path=ppt/slides/slide32.xml><?xml version="1.0" encoding="utf-8"?>
+<p:sld xmlns:a="http://schemas.openxmlformats.org/drawingml/2006/main" xmlns:r="http://schemas.openxmlformats.org/officeDocument/2006/relationships" xmlns:p="http://schemas.openxmlformats.org/presentationml/2006/main">
+  <p:cSld>
+    <p:spTree>
+      <p:nvGrpSpPr>
+        <p:cNvPr id="1" name=""/>
+        <p:cNvGrpSpPr/>
+        <p:nvPr/>
+      </p:nvGrpSpPr>
+      <p:grpSpPr>
+        <a:xfrm>
+          <a:off x="0" y="0"/>
+          <a:ext cx="0" cy="0"/>
+          <a:chOff x="0" y="0"/>
+          <a:chExt cx="0" cy="0"/>
+        </a:xfrm>
+      </p:grpSpPr>
+      <p:sp>
+        <p:nvSpPr>
+          <p:cNvPr id="3" name="Inhaltsplatzhalter 2">
+            <a:extLst>
+              <a:ext uri="{FF2B5EF4-FFF2-40B4-BE49-F238E27FC236}">
+                <a16:creationId xmlns:a16="http://schemas.microsoft.com/office/drawing/2014/main" id="{2E6429AE-1593-4842-86AE-D92C0ED8B22D}"/>
+              </a:ext>
+            </a:extLst>
+          </p:cNvPr>
+          <p:cNvSpPr>
+            <a:spLocks noGrp="1"/>
+          </p:cNvSpPr>
+          <p:nvPr>
+            <p:ph idx="1"/>
+          </p:nvPr>
+        </p:nvSpPr>
+        <p:spPr>
+          <a:xfrm>
+            <a:off x="838200" y="1825624"/>
+            <a:ext cx="10515600" cy="4879975"/>
+          </a:xfrm>
+        </p:spPr>
+        <p:txBody>
+          <a:bodyPr>
+            <a:normAutofit/>
+          </a:bodyPr>
+          <a:lstStyle/>
+          <a:p>
+            <a:r>
+              <a:rPr lang="de-DE" sz="2400" dirty="0"/>
+              <a:t>Zum Reiter </a:t>
+            </a:r>
+            <a:r>
+              <a:rPr lang="de-DE" sz="2400" dirty="0" err="1"/>
+              <a:t>Datenverkehrregel</a:t>
+            </a:r>
+            <a:endParaRPr lang="de-DE" sz="2400" dirty="0"/>
+          </a:p>
+          <a:p>
+            <a:r>
+              <a:rPr lang="de-DE" sz="2400" dirty="0"/>
+              <a:t>Regel ‚Hinzufügen‘ klicken</a:t>
+            </a:r>
+          </a:p>
+          <a:p>
+            <a:r>
+              <a:rPr lang="de-DE" sz="2400" dirty="0"/>
+              <a:t>Zulassen </a:t>
+            </a:r>
+            <a:r>
+              <a:rPr lang="de-DE" sz="2400" dirty="0">
+                <a:sym typeface="Wingdings" panose="05000000000000000000" pitchFamily="2" charset="2"/>
+              </a:rPr>
+              <a:t> Weiter</a:t>
+            </a:r>
+          </a:p>
+          <a:p>
+            <a:endParaRPr lang="de-DE" sz="2400" dirty="0">
+              <a:sym typeface="Wingdings" panose="05000000000000000000" pitchFamily="2" charset="2"/>
+            </a:endParaRPr>
+          </a:p>
+          <a:p>
+            <a:endParaRPr lang="de-DE" sz="2400" dirty="0">
+              <a:sym typeface="Wingdings" panose="05000000000000000000" pitchFamily="2" charset="2"/>
+            </a:endParaRPr>
+          </a:p>
+          <a:p>
+            <a:endParaRPr lang="de-DE" sz="2400" dirty="0">
+              <a:sym typeface="Wingdings" panose="05000000000000000000" pitchFamily="2" charset="2"/>
+            </a:endParaRPr>
+          </a:p>
+          <a:p>
+            <a:r>
+              <a:rPr lang="de-DE" sz="2400" dirty="0">
+                <a:sym typeface="Wingdings" panose="05000000000000000000" pitchFamily="2" charset="2"/>
+              </a:rPr>
+              <a:t>Verbindungen zu und von anderen Computern  Weiter</a:t>
+            </a:r>
+            <a:endParaRPr lang="de-DE" sz="2400" dirty="0"/>
+          </a:p>
+        </p:txBody>
+      </p:sp>
+      <p:sp>
+        <p:nvSpPr>
+          <p:cNvPr id="2" name="Titel 1">
+            <a:extLst>
+              <a:ext uri="{FF2B5EF4-FFF2-40B4-BE49-F238E27FC236}">
+                <a16:creationId xmlns:a16="http://schemas.microsoft.com/office/drawing/2014/main" id="{DB8D5029-1223-4C9E-9BB1-52F91CFADFA1}"/>
+              </a:ext>
+            </a:extLst>
+          </p:cNvPr>
+          <p:cNvSpPr>
+            <a:spLocks noGrp="1"/>
+          </p:cNvSpPr>
+          <p:nvPr>
+            <p:ph type="title"/>
+          </p:nvPr>
+        </p:nvSpPr>
+        <p:spPr/>
+        <p:txBody>
+          <a:bodyPr/>
+          <a:lstStyle/>
+          <a:p>
+            <a:pPr lvl="0"/>
+            <a:r>
+              <a:rPr lang="de-DE" dirty="0"/>
+              <a:t>Ausnahmeregel für Firewall hinzufügen</a:t>
+            </a:r>
+            <a:endParaRPr lang="en-US" dirty="0"/>
+          </a:p>
+        </p:txBody>
+      </p:sp>
+      <p:pic>
+        <p:nvPicPr>
+          <p:cNvPr id="6" name="Grafik 5">
+            <a:extLst>
+              <a:ext uri="{FF2B5EF4-FFF2-40B4-BE49-F238E27FC236}">
+                <a16:creationId xmlns:a16="http://schemas.microsoft.com/office/drawing/2014/main" id="{320A9383-6BAE-4089-BEE0-6D36CFFF0CC0}"/>
+              </a:ext>
+            </a:extLst>
+          </p:cNvPr>
+          <p:cNvPicPr>
+            <a:picLocks noChangeAspect="1"/>
+          </p:cNvPicPr>
+          <p:nvPr/>
+        </p:nvPicPr>
+        <p:blipFill>
+          <a:blip r:embed="rId2">
+            <a:extLst>
+              <a:ext uri="{28A0092B-C50C-407E-A947-70E740481C1C}">
+                <a14:useLocalDpi xmlns:a14="http://schemas.microsoft.com/office/drawing/2010/main" val="0"/>
+              </a:ext>
+            </a:extLst>
+          </a:blip>
+          <a:stretch>
+            <a:fillRect/>
+          </a:stretch>
+        </p:blipFill>
+        <p:spPr>
+          <a:xfrm>
+            <a:off x="1114892" y="5185930"/>
+            <a:ext cx="4772691" cy="543001"/>
+          </a:xfrm>
+          <a:prstGeom prst="rect">
+            <a:avLst/>
+          </a:prstGeom>
+        </p:spPr>
+      </p:pic>
+      <p:pic>
+        <p:nvPicPr>
+          <p:cNvPr id="8" name="Grafik 7" descr="Ein Bild, das Screenshot enthält.&#10;&#10;Automatisch generierte Beschreibung">
+            <a:extLst>
+              <a:ext uri="{FF2B5EF4-FFF2-40B4-BE49-F238E27FC236}">
+                <a16:creationId xmlns:a16="http://schemas.microsoft.com/office/drawing/2014/main" id="{0B4B1981-72DD-4530-8701-09B66C4BCC76}"/>
+              </a:ext>
+            </a:extLst>
+          </p:cNvPr>
+          <p:cNvPicPr>
+            <a:picLocks noChangeAspect="1"/>
+          </p:cNvPicPr>
+          <p:nvPr/>
+        </p:nvPicPr>
+        <p:blipFill>
+          <a:blip r:embed="rId3">
+            <a:extLst>
+              <a:ext uri="{28A0092B-C50C-407E-A947-70E740481C1C}">
+                <a14:useLocalDpi xmlns:a14="http://schemas.microsoft.com/office/drawing/2010/main" val="0"/>
+              </a:ext>
+            </a:extLst>
+          </a:blip>
+          <a:stretch>
+            <a:fillRect/>
+          </a:stretch>
+        </p:blipFill>
+        <p:spPr>
+          <a:xfrm>
+            <a:off x="1114892" y="3317985"/>
+            <a:ext cx="6458851" cy="1200318"/>
+          </a:xfrm>
+          <a:prstGeom prst="rect">
+            <a:avLst/>
+          </a:prstGeom>
+        </p:spPr>
+      </p:pic>
+    </p:spTree>
+    <p:extLst>
+      <p:ext uri="{BB962C8B-B14F-4D97-AF65-F5344CB8AC3E}">
+        <p14:creationId xmlns:p14="http://schemas.microsoft.com/office/powerpoint/2010/main" val="1550119426"/>
+      </p:ext>
+    </p:extLst>
+  </p:cSld>
+  <p:clrMapOvr>
+    <a:masterClrMapping/>
+  </p:clrMapOvr>
+</p:sld>
+</file>
+
+<file path=ppt/slides/slide33.xml><?xml version="1.0" encoding="utf-8"?>
+<p:sld xmlns:a="http://schemas.openxmlformats.org/drawingml/2006/main" xmlns:r="http://schemas.openxmlformats.org/officeDocument/2006/relationships" xmlns:p="http://schemas.openxmlformats.org/presentationml/2006/main">
+  <p:cSld>
+    <p:spTree>
+      <p:nvGrpSpPr>
+        <p:cNvPr id="1" name=""/>
+        <p:cNvGrpSpPr/>
+        <p:nvPr/>
+      </p:nvGrpSpPr>
+      <p:grpSpPr>
+        <a:xfrm>
+          <a:off x="0" y="0"/>
+          <a:ext cx="0" cy="0"/>
+          <a:chOff x="0" y="0"/>
+          <a:chExt cx="0" cy="0"/>
+        </a:xfrm>
+      </p:grpSpPr>
+      <p:sp>
+        <p:nvSpPr>
+          <p:cNvPr id="3" name="Inhaltsplatzhalter 2">
+            <a:extLst>
+              <a:ext uri="{FF2B5EF4-FFF2-40B4-BE49-F238E27FC236}">
+                <a16:creationId xmlns:a16="http://schemas.microsoft.com/office/drawing/2014/main" id="{2E6429AE-1593-4842-86AE-D92C0ED8B22D}"/>
+              </a:ext>
+            </a:extLst>
+          </p:cNvPr>
+          <p:cNvSpPr>
+            <a:spLocks noGrp="1"/>
+          </p:cNvSpPr>
+          <p:nvPr>
+            <p:ph idx="1"/>
+          </p:nvPr>
+        </p:nvSpPr>
+        <p:spPr>
+          <a:xfrm>
+            <a:off x="838200" y="1825624"/>
+            <a:ext cx="10515600" cy="4879975"/>
+          </a:xfrm>
+        </p:spPr>
+        <p:txBody>
+          <a:bodyPr>
+            <a:normAutofit/>
+          </a:bodyPr>
+          <a:lstStyle/>
+          <a:p>
+            <a:r>
+              <a:rPr lang="de-DE" sz="2400" dirty="0"/>
+              <a:t>Nur folgende Computer und Sites </a:t>
+            </a:r>
+            <a:r>
+              <a:rPr lang="de-DE" sz="2400" dirty="0">
+                <a:sym typeface="Wingdings" panose="05000000000000000000" pitchFamily="2" charset="2"/>
+              </a:rPr>
+              <a:t> Einzeln  10.0.75.0 bis 10.0.75.2  OK</a:t>
+            </a:r>
+          </a:p>
+          <a:p>
+            <a:r>
+              <a:rPr lang="de-DE" sz="2400" dirty="0">
+                <a:sym typeface="Wingdings" panose="05000000000000000000" pitchFamily="2" charset="2"/>
+              </a:rPr>
+              <a:t> Weiter 				  		      Weiter bis Dialogende</a:t>
+            </a:r>
+          </a:p>
+          <a:p>
+            <a:pPr lvl="8"/>
+            <a:endParaRPr lang="de-DE" sz="2400" dirty="0">
+              <a:sym typeface="Wingdings" panose="05000000000000000000" pitchFamily="2" charset="2"/>
+            </a:endParaRPr>
+          </a:p>
+          <a:p>
+            <a:pPr lvl="8"/>
+            <a:endParaRPr lang="de-DE" sz="2400" dirty="0">
+              <a:sym typeface="Wingdings" panose="05000000000000000000" pitchFamily="2" charset="2"/>
+            </a:endParaRPr>
+          </a:p>
+          <a:p>
+            <a:pPr lvl="8"/>
+            <a:endParaRPr lang="de-DE" sz="2400" dirty="0"/>
+          </a:p>
+        </p:txBody>
+      </p:sp>
+      <p:sp>
+        <p:nvSpPr>
+          <p:cNvPr id="2" name="Titel 1">
+            <a:extLst>
+              <a:ext uri="{FF2B5EF4-FFF2-40B4-BE49-F238E27FC236}">
+                <a16:creationId xmlns:a16="http://schemas.microsoft.com/office/drawing/2014/main" id="{DB8D5029-1223-4C9E-9BB1-52F91CFADFA1}"/>
+              </a:ext>
+            </a:extLst>
+          </p:cNvPr>
+          <p:cNvSpPr>
+            <a:spLocks noGrp="1"/>
+          </p:cNvSpPr>
+          <p:nvPr>
+            <p:ph type="title"/>
+          </p:nvPr>
+        </p:nvSpPr>
+        <p:spPr/>
+        <p:txBody>
+          <a:bodyPr/>
+          <a:lstStyle/>
+          <a:p>
+            <a:pPr lvl="0"/>
+            <a:r>
+              <a:rPr lang="de-DE" dirty="0"/>
+              <a:t>Ausnahmeregel für Firewall hinzufügen</a:t>
+            </a:r>
+            <a:endParaRPr lang="en-US" dirty="0"/>
+          </a:p>
+        </p:txBody>
+      </p:sp>
+      <p:grpSp>
+        <p:nvGrpSpPr>
+          <p:cNvPr id="7" name="Gruppieren 6">
+            <a:extLst>
+              <a:ext uri="{FF2B5EF4-FFF2-40B4-BE49-F238E27FC236}">
+                <a16:creationId xmlns:a16="http://schemas.microsoft.com/office/drawing/2014/main" id="{14C23C7F-E3CA-4147-83CF-941928879D1D}"/>
+              </a:ext>
+            </a:extLst>
+          </p:cNvPr>
+          <p:cNvGrpSpPr/>
+          <p:nvPr/>
+        </p:nvGrpSpPr>
+        <p:grpSpPr>
+          <a:xfrm>
+            <a:off x="504022" y="2372567"/>
+            <a:ext cx="6885542" cy="4120308"/>
+            <a:chOff x="1189822" y="2372567"/>
+            <a:chExt cx="6885542" cy="4120308"/>
+          </a:xfrm>
+        </p:grpSpPr>
+        <p:pic>
+          <p:nvPicPr>
+            <p:cNvPr id="5" name="Grafik 4" descr="Ein Bild, das Screenshot enthält.&#10;&#10;Automatisch generierte Beschreibung">
+              <a:extLst>
+                <a:ext uri="{FF2B5EF4-FFF2-40B4-BE49-F238E27FC236}">
+                  <a16:creationId xmlns:a16="http://schemas.microsoft.com/office/drawing/2014/main" id="{21AE262B-33E2-40FA-B1B4-189CF0A84631}"/>
+                </a:ext>
+              </a:extLst>
+            </p:cNvPr>
+            <p:cNvPicPr>
+              <a:picLocks noChangeAspect="1"/>
+            </p:cNvPicPr>
+            <p:nvPr/>
+          </p:nvPicPr>
+          <p:blipFill rotWithShape="1">
+            <a:blip r:embed="rId2">
+              <a:extLst>
+                <a:ext uri="{28A0092B-C50C-407E-A947-70E740481C1C}">
+                  <a14:useLocalDpi xmlns:a14="http://schemas.microsoft.com/office/drawing/2010/main" val="0"/>
+                </a:ext>
+              </a:extLst>
+            </a:blip>
+            <a:srcRect l="1280" t="2976" r="3365" b="16929"/>
+            <a:stretch/>
+          </p:blipFill>
+          <p:spPr>
+            <a:xfrm>
+              <a:off x="1189822" y="2372567"/>
+              <a:ext cx="6885542" cy="4120308"/>
+            </a:xfrm>
+            <a:prstGeom prst="rect">
+              <a:avLst/>
+            </a:prstGeom>
+          </p:spPr>
+        </p:pic>
+        <p:sp>
+          <p:nvSpPr>
+            <p:cNvPr id="11" name="Rechteck: abgerundete Ecken 10">
+              <a:extLst>
+                <a:ext uri="{FF2B5EF4-FFF2-40B4-BE49-F238E27FC236}">
+                  <a16:creationId xmlns:a16="http://schemas.microsoft.com/office/drawing/2014/main" id="{7254EB64-7B1C-4FFB-BDBA-791DE02886BC}"/>
+                </a:ext>
+              </a:extLst>
+            </p:cNvPr>
+            <p:cNvSpPr/>
+            <p:nvPr/>
+          </p:nvSpPr>
+          <p:spPr>
+            <a:xfrm>
+              <a:off x="1189822" y="3745734"/>
+              <a:ext cx="2192357" cy="198305"/>
+            </a:xfrm>
+            <a:prstGeom prst="roundRect">
+              <a:avLst/>
+            </a:prstGeom>
+            <a:noFill/>
+            <a:ln w="38100">
+              <a:solidFill>
+                <a:srgbClr val="FF0000"/>
+              </a:solidFill>
+            </a:ln>
+          </p:spPr>
+          <p:style>
+            <a:lnRef idx="2">
+              <a:schemeClr val="accent1">
+                <a:shade val="50000"/>
+              </a:schemeClr>
+            </a:lnRef>
+            <a:fillRef idx="1">
+              <a:schemeClr val="accent1"/>
+            </a:fillRef>
+            <a:effectRef idx="0">
+              <a:schemeClr val="accent1"/>
+            </a:effectRef>
+            <a:fontRef idx="minor">
+              <a:schemeClr val="lt1"/>
+            </a:fontRef>
+          </p:style>
+          <p:txBody>
+            <a:bodyPr rtlCol="0" anchor="ctr"/>
+            <a:lstStyle/>
+            <a:p>
+              <a:pPr algn="ctr"/>
+              <a:endParaRPr lang="en-US"/>
+            </a:p>
+          </p:txBody>
+        </p:sp>
+        <p:sp>
+          <p:nvSpPr>
+            <p:cNvPr id="9" name="Rechteck: abgerundete Ecken 8">
+              <a:extLst>
+                <a:ext uri="{FF2B5EF4-FFF2-40B4-BE49-F238E27FC236}">
+                  <a16:creationId xmlns:a16="http://schemas.microsoft.com/office/drawing/2014/main" id="{A37ACB5C-F575-4A8A-B95D-3B7C87C64D09}"/>
+                </a:ext>
+              </a:extLst>
+            </p:cNvPr>
+            <p:cNvSpPr/>
+            <p:nvPr/>
+          </p:nvSpPr>
+          <p:spPr>
+            <a:xfrm>
+              <a:off x="3903643" y="5087956"/>
+              <a:ext cx="2192357" cy="198305"/>
+            </a:xfrm>
+            <a:prstGeom prst="roundRect">
+              <a:avLst/>
+            </a:prstGeom>
+            <a:noFill/>
+            <a:ln w="38100">
+              <a:solidFill>
+                <a:srgbClr val="FF0000"/>
+              </a:solidFill>
+            </a:ln>
+          </p:spPr>
+          <p:style>
+            <a:lnRef idx="2">
+              <a:schemeClr val="accent1">
+                <a:shade val="50000"/>
+              </a:schemeClr>
+            </a:lnRef>
+            <a:fillRef idx="1">
+              <a:schemeClr val="accent1"/>
+            </a:fillRef>
+            <a:effectRef idx="0">
+              <a:schemeClr val="accent1"/>
+            </a:effectRef>
+            <a:fontRef idx="minor">
+              <a:schemeClr val="lt1"/>
+            </a:fontRef>
+          </p:style>
+          <p:txBody>
+            <a:bodyPr rtlCol="0" anchor="ctr"/>
+            <a:lstStyle/>
+            <a:p>
+              <a:pPr algn="ctr"/>
+              <a:endParaRPr lang="en-US"/>
+            </a:p>
+          </p:txBody>
+        </p:sp>
+        <p:sp>
+          <p:nvSpPr>
+            <p:cNvPr id="10" name="Rechteck: abgerundete Ecken 9">
+              <a:extLst>
+                <a:ext uri="{FF2B5EF4-FFF2-40B4-BE49-F238E27FC236}">
+                  <a16:creationId xmlns:a16="http://schemas.microsoft.com/office/drawing/2014/main" id="{F3B5F1D9-1864-42A5-A7CC-5D48362E4CA3}"/>
+                </a:ext>
+              </a:extLst>
+            </p:cNvPr>
+            <p:cNvSpPr/>
+            <p:nvPr/>
+          </p:nvSpPr>
+          <p:spPr>
+            <a:xfrm>
+              <a:off x="3903642" y="3844886"/>
+              <a:ext cx="2192357" cy="198305"/>
+            </a:xfrm>
+            <a:prstGeom prst="roundRect">
+              <a:avLst/>
+            </a:prstGeom>
+            <a:noFill/>
+            <a:ln w="38100">
+              <a:solidFill>
+                <a:srgbClr val="FF0000"/>
+              </a:solidFill>
+            </a:ln>
+          </p:spPr>
+          <p:style>
+            <a:lnRef idx="2">
+              <a:schemeClr val="accent1">
+                <a:shade val="50000"/>
+              </a:schemeClr>
+            </a:lnRef>
+            <a:fillRef idx="1">
+              <a:schemeClr val="accent1"/>
+            </a:fillRef>
+            <a:effectRef idx="0">
+              <a:schemeClr val="accent1"/>
+            </a:effectRef>
+            <a:fontRef idx="minor">
+              <a:schemeClr val="lt1"/>
+            </a:fontRef>
+          </p:style>
+          <p:txBody>
+            <a:bodyPr rtlCol="0" anchor="ctr"/>
+            <a:lstStyle/>
+            <a:p>
+              <a:pPr algn="ctr"/>
+              <a:endParaRPr lang="en-US"/>
+            </a:p>
+          </p:txBody>
+        </p:sp>
+      </p:grpSp>
+    </p:spTree>
+    <p:extLst>
+      <p:ext uri="{BB962C8B-B14F-4D97-AF65-F5344CB8AC3E}">
+        <p14:creationId xmlns:p14="http://schemas.microsoft.com/office/powerpoint/2010/main" val="3343920438"/>
+      </p:ext>
+    </p:extLst>
+  </p:cSld>
+  <p:clrMapOvr>
+    <a:masterClrMapping/>
+  </p:clrMapOvr>
+</p:sld>
+</file>
+
+<file path=ppt/slides/slide34.xml><?xml version="1.0" encoding="utf-8"?>
+<p:sld xmlns:a="http://schemas.openxmlformats.org/drawingml/2006/main" xmlns:r="http://schemas.openxmlformats.org/officeDocument/2006/relationships" xmlns:p="http://schemas.openxmlformats.org/presentationml/2006/main">
+  <p:cSld>
+    <p:spTree>
+      <p:nvGrpSpPr>
+        <p:cNvPr id="1" name=""/>
+        <p:cNvGrpSpPr/>
+        <p:nvPr/>
+      </p:nvGrpSpPr>
+      <p:grpSpPr>
+        <a:xfrm>
+          <a:off x="0" y="0"/>
+          <a:ext cx="0" cy="0"/>
+          <a:chOff x="0" y="0"/>
+          <a:chExt cx="0" cy="0"/>
+        </a:xfrm>
+      </p:grpSpPr>
+      <p:sp>
+        <p:nvSpPr>
+          <p:cNvPr id="3" name="Inhaltsplatzhalter 2">
+            <a:extLst>
+              <a:ext uri="{FF2B5EF4-FFF2-40B4-BE49-F238E27FC236}">
+                <a16:creationId xmlns:a16="http://schemas.microsoft.com/office/drawing/2014/main" id="{2E6429AE-1593-4842-86AE-D92C0ED8B22D}"/>
+              </a:ext>
+            </a:extLst>
+          </p:cNvPr>
+          <p:cNvSpPr>
+            <a:spLocks noGrp="1"/>
+          </p:cNvSpPr>
+          <p:nvPr>
+            <p:ph idx="1"/>
+          </p:nvPr>
+        </p:nvSpPr>
+        <p:spPr>
+          <a:xfrm>
+            <a:off x="838200" y="1825624"/>
+            <a:ext cx="10515600" cy="4879975"/>
+          </a:xfrm>
+        </p:spPr>
+        <p:txBody>
+          <a:bodyPr>
+            <a:normAutofit/>
+          </a:bodyPr>
+          <a:lstStyle/>
+          <a:p>
+            <a:r>
+              <a:rPr lang="de-DE" sz="2400" dirty="0"/>
+              <a:t>Rechtklick auf Docker Desktop Icon</a:t>
+            </a:r>
+          </a:p>
+          <a:p>
+            <a:r>
+              <a:rPr lang="de-DE" sz="2400" dirty="0"/>
+              <a:t>Settings wählen</a:t>
+            </a:r>
+          </a:p>
+          <a:p>
+            <a:r>
+              <a:rPr lang="de-DE" sz="2400" dirty="0"/>
+              <a:t>Haken bei </a:t>
+            </a:r>
+            <a:r>
+              <a:rPr lang="de-DE" sz="2400" dirty="0" err="1"/>
+              <a:t>Expose</a:t>
+            </a:r>
+            <a:r>
+              <a:rPr lang="de-DE" sz="2400" dirty="0"/>
+              <a:t> </a:t>
+            </a:r>
+            <a:r>
+              <a:rPr lang="de-DE" sz="2400" dirty="0" err="1"/>
+              <a:t>daemon</a:t>
+            </a:r>
+            <a:r>
+              <a:rPr lang="de-DE" sz="2400" dirty="0"/>
+              <a:t> setzen</a:t>
+            </a:r>
+          </a:p>
+          <a:p>
+            <a:endParaRPr lang="de-DE" sz="2400" dirty="0"/>
+          </a:p>
+          <a:p>
+            <a:endParaRPr lang="de-DE" sz="2400" dirty="0"/>
+          </a:p>
+        </p:txBody>
+      </p:sp>
+      <p:sp>
+        <p:nvSpPr>
+          <p:cNvPr id="2" name="Titel 1">
+            <a:extLst>
+              <a:ext uri="{FF2B5EF4-FFF2-40B4-BE49-F238E27FC236}">
+                <a16:creationId xmlns:a16="http://schemas.microsoft.com/office/drawing/2014/main" id="{DB8D5029-1223-4C9E-9BB1-52F91CFADFA1}"/>
+              </a:ext>
+            </a:extLst>
+          </p:cNvPr>
+          <p:cNvSpPr>
+            <a:spLocks noGrp="1"/>
+          </p:cNvSpPr>
+          <p:nvPr>
+            <p:ph type="title"/>
+          </p:nvPr>
+        </p:nvSpPr>
+        <p:spPr/>
+        <p:txBody>
+          <a:bodyPr/>
+          <a:lstStyle/>
+          <a:p>
+            <a:pPr lvl="0"/>
+            <a:r>
+              <a:rPr lang="de-DE" dirty="0"/>
+              <a:t>Docker </a:t>
+            </a:r>
+            <a:r>
+              <a:rPr lang="de-DE" dirty="0" err="1"/>
+              <a:t>Expose</a:t>
+            </a:r>
+            <a:r>
+              <a:rPr lang="de-DE" dirty="0"/>
+              <a:t> </a:t>
+            </a:r>
+            <a:r>
+              <a:rPr lang="de-DE" dirty="0" err="1"/>
+              <a:t>Daemon</a:t>
+            </a:r>
+            <a:endParaRPr lang="en-US" dirty="0"/>
+          </a:p>
+        </p:txBody>
+      </p:sp>
+      <p:grpSp>
+        <p:nvGrpSpPr>
+          <p:cNvPr id="14" name="Gruppieren 13">
+            <a:extLst>
+              <a:ext uri="{FF2B5EF4-FFF2-40B4-BE49-F238E27FC236}">
+                <a16:creationId xmlns:a16="http://schemas.microsoft.com/office/drawing/2014/main" id="{A7E90F94-D149-4F1F-BC7E-15AD24AE91F1}"/>
+              </a:ext>
+            </a:extLst>
+          </p:cNvPr>
+          <p:cNvGrpSpPr/>
+          <p:nvPr/>
+        </p:nvGrpSpPr>
+        <p:grpSpPr>
+          <a:xfrm>
+            <a:off x="6096001" y="1106423"/>
+            <a:ext cx="2426885" cy="1717739"/>
+            <a:chOff x="7782646" y="1027906"/>
+            <a:chExt cx="3202830" cy="2266950"/>
+          </a:xfrm>
+        </p:grpSpPr>
+        <p:grpSp>
+          <p:nvGrpSpPr>
+            <p:cNvPr id="8" name="Gruppieren 7">
+              <a:extLst>
+                <a:ext uri="{FF2B5EF4-FFF2-40B4-BE49-F238E27FC236}">
+                  <a16:creationId xmlns:a16="http://schemas.microsoft.com/office/drawing/2014/main" id="{669D70BB-8F03-49D6-9261-33CD61233827}"/>
+                </a:ext>
+              </a:extLst>
+            </p:cNvPr>
+            <p:cNvGrpSpPr/>
+            <p:nvPr/>
+          </p:nvGrpSpPr>
+          <p:grpSpPr>
+            <a:xfrm>
+              <a:off x="7909766" y="1027906"/>
+              <a:ext cx="3075710" cy="2266950"/>
+              <a:chOff x="7909766" y="1027906"/>
+              <a:chExt cx="3075710" cy="2266950"/>
+            </a:xfrm>
+          </p:grpSpPr>
+          <p:pic>
+            <p:nvPicPr>
+              <p:cNvPr id="4" name="Grafik 3">
+                <a:extLst>
+                  <a:ext uri="{FF2B5EF4-FFF2-40B4-BE49-F238E27FC236}">
+                    <a16:creationId xmlns:a16="http://schemas.microsoft.com/office/drawing/2014/main" id="{63C89446-E452-4F50-8364-3E43A0A1B5B1}"/>
+                  </a:ext>
+                </a:extLst>
+              </p:cNvPr>
+              <p:cNvPicPr>
+                <a:picLocks noChangeAspect="1"/>
+              </p:cNvPicPr>
+              <p:nvPr/>
+            </p:nvPicPr>
+            <p:blipFill>
+              <a:blip r:embed="rId2"/>
+              <a:stretch>
+                <a:fillRect/>
+              </a:stretch>
+            </p:blipFill>
+            <p:spPr>
+              <a:xfrm>
+                <a:off x="7909766" y="1027906"/>
+                <a:ext cx="2762250" cy="2266950"/>
+              </a:xfrm>
+              <a:prstGeom prst="rect">
+                <a:avLst/>
+              </a:prstGeom>
+            </p:spPr>
+          </p:pic>
+          <p:sp>
+            <p:nvSpPr>
+              <p:cNvPr id="6" name="Rechteck 5">
+                <a:extLst>
+                  <a:ext uri="{FF2B5EF4-FFF2-40B4-BE49-F238E27FC236}">
+                    <a16:creationId xmlns:a16="http://schemas.microsoft.com/office/drawing/2014/main" id="{103F2249-CB60-487F-AC43-B44D4FF14292}"/>
+                  </a:ext>
+                </a:extLst>
+              </p:cNvPr>
+              <p:cNvSpPr/>
+              <p:nvPr/>
+            </p:nvSpPr>
+            <p:spPr>
+              <a:xfrm>
+                <a:off x="9806671" y="1027906"/>
+                <a:ext cx="1178805" cy="1872867"/>
+              </a:xfrm>
+              <a:prstGeom prst="rect">
+                <a:avLst/>
+              </a:prstGeom>
+              <a:solidFill>
+                <a:schemeClr val="bg1"/>
+              </a:solidFill>
+              <a:ln>
+                <a:noFill/>
+              </a:ln>
+            </p:spPr>
+            <p:style>
+              <a:lnRef idx="2">
+                <a:schemeClr val="accent1">
+                  <a:shade val="50000"/>
+                </a:schemeClr>
+              </a:lnRef>
+              <a:fillRef idx="1">
+                <a:schemeClr val="accent1"/>
+              </a:fillRef>
+              <a:effectRef idx="0">
+                <a:schemeClr val="accent1"/>
+              </a:effectRef>
+              <a:fontRef idx="minor">
+                <a:schemeClr val="lt1"/>
+              </a:fontRef>
+            </p:style>
+            <p:txBody>
+              <a:bodyPr rtlCol="0" anchor="ctr"/>
+              <a:lstStyle/>
+              <a:p>
+                <a:pPr algn="ctr"/>
+                <a:endParaRPr lang="en-US"/>
+              </a:p>
+            </p:txBody>
+          </p:sp>
+        </p:grpSp>
+        <p:sp>
+          <p:nvSpPr>
+            <p:cNvPr id="12" name="Rechteck: abgerundete Ecken 11">
+              <a:extLst>
+                <a:ext uri="{FF2B5EF4-FFF2-40B4-BE49-F238E27FC236}">
+                  <a16:creationId xmlns:a16="http://schemas.microsoft.com/office/drawing/2014/main" id="{95D1519A-3208-48C6-8843-C168BC55E509}"/>
+                </a:ext>
+              </a:extLst>
+            </p:cNvPr>
+            <p:cNvSpPr/>
+            <p:nvPr/>
+          </p:nvSpPr>
+          <p:spPr>
+            <a:xfrm>
+              <a:off x="7782646" y="2495130"/>
+              <a:ext cx="574970" cy="405642"/>
+            </a:xfrm>
+            <a:prstGeom prst="roundRect">
+              <a:avLst/>
+            </a:prstGeom>
+            <a:noFill/>
+            <a:ln w="38100">
+              <a:solidFill>
+                <a:srgbClr val="FF0000"/>
+              </a:solidFill>
+            </a:ln>
+          </p:spPr>
+          <p:style>
+            <a:lnRef idx="2">
+              <a:schemeClr val="accent1">
+                <a:shade val="50000"/>
+              </a:schemeClr>
+            </a:lnRef>
+            <a:fillRef idx="1">
+              <a:schemeClr val="accent1"/>
+            </a:fillRef>
+            <a:effectRef idx="0">
+              <a:schemeClr val="accent1"/>
+            </a:effectRef>
+            <a:fontRef idx="minor">
+              <a:schemeClr val="lt1"/>
+            </a:fontRef>
+          </p:style>
+          <p:txBody>
+            <a:bodyPr rtlCol="0" anchor="ctr"/>
+            <a:lstStyle/>
+            <a:p>
+              <a:pPr algn="ctr"/>
+              <a:endParaRPr lang="en-US" dirty="0"/>
+            </a:p>
+          </p:txBody>
+        </p:sp>
+      </p:grpSp>
+      <p:pic>
+        <p:nvPicPr>
+          <p:cNvPr id="5" name="Grafik 4">
+            <a:extLst>
+              <a:ext uri="{FF2B5EF4-FFF2-40B4-BE49-F238E27FC236}">
+                <a16:creationId xmlns:a16="http://schemas.microsoft.com/office/drawing/2014/main" id="{9A0F8C66-1EAA-42E7-87E7-DB8F9F9E52C9}"/>
+              </a:ext>
+            </a:extLst>
+          </p:cNvPr>
+          <p:cNvPicPr>
+            <a:picLocks noChangeAspect="1"/>
+          </p:cNvPicPr>
+          <p:nvPr/>
+        </p:nvPicPr>
+        <p:blipFill>
+          <a:blip r:embed="rId3"/>
+          <a:stretch>
+            <a:fillRect/>
+          </a:stretch>
+        </p:blipFill>
+        <p:spPr>
+          <a:xfrm>
+            <a:off x="1169585" y="3266851"/>
+            <a:ext cx="6748849" cy="3586386"/>
+          </a:xfrm>
+          <a:prstGeom prst="rect">
+            <a:avLst/>
+          </a:prstGeom>
+        </p:spPr>
+      </p:pic>
+      <p:sp>
+        <p:nvSpPr>
+          <p:cNvPr id="11" name="Rechteck: abgerundete Ecken 10">
+            <a:extLst>
+              <a:ext uri="{FF2B5EF4-FFF2-40B4-BE49-F238E27FC236}">
+                <a16:creationId xmlns:a16="http://schemas.microsoft.com/office/drawing/2014/main" id="{844FA0F4-BAB4-4774-8C6C-5DF9A16FD57F}"/>
+              </a:ext>
+            </a:extLst>
+          </p:cNvPr>
+          <p:cNvSpPr/>
+          <p:nvPr/>
+        </p:nvSpPr>
+        <p:spPr>
+          <a:xfrm>
+            <a:off x="2980944" y="6117335"/>
+            <a:ext cx="274130" cy="254793"/>
+          </a:xfrm>
+          <a:prstGeom prst="roundRect">
+            <a:avLst/>
+          </a:prstGeom>
+          <a:noFill/>
+          <a:ln w="38100">
+            <a:solidFill>
+              <a:srgbClr val="FF0000"/>
+            </a:solidFill>
+          </a:ln>
+        </p:spPr>
+        <p:style>
+          <a:lnRef idx="2">
+            <a:schemeClr val="accent1">
+              <a:shade val="50000"/>
+            </a:schemeClr>
+          </a:lnRef>
+          <a:fillRef idx="1">
+            <a:schemeClr val="accent1"/>
+          </a:fillRef>
+          <a:effectRef idx="0">
+            <a:schemeClr val="accent1"/>
+          </a:effectRef>
+          <a:fontRef idx="minor">
+            <a:schemeClr val="lt1"/>
+          </a:fontRef>
+        </p:style>
+        <p:txBody>
+          <a:bodyPr rtlCol="0" anchor="ctr"/>
+          <a:lstStyle/>
+          <a:p>
+            <a:pPr algn="ctr"/>
+            <a:endParaRPr lang="en-US" dirty="0"/>
+          </a:p>
+        </p:txBody>
+      </p:sp>
+    </p:spTree>
+    <p:extLst>
+      <p:ext uri="{BB962C8B-B14F-4D97-AF65-F5344CB8AC3E}">
+        <p14:creationId xmlns:p14="http://schemas.microsoft.com/office/powerpoint/2010/main" val="1761934286"/>
+      </p:ext>
+    </p:extLst>
+  </p:cSld>
+  <p:clrMapOvr>
+    <a:masterClrMapping/>
+  </p:clrMapOvr>
+</p:sld>
+</file>
+
+<file path=ppt/slides/slide35.xml><?xml version="1.0" encoding="utf-8"?>
+<p:sld xmlns:a="http://schemas.openxmlformats.org/drawingml/2006/main" xmlns:r="http://schemas.openxmlformats.org/officeDocument/2006/relationships" xmlns:p="http://schemas.openxmlformats.org/presentationml/2006/main">
+  <p:cSld>
+    <p:spTree>
+      <p:nvGrpSpPr>
+        <p:cNvPr id="1" name=""/>
+        <p:cNvGrpSpPr/>
+        <p:nvPr/>
+      </p:nvGrpSpPr>
+      <p:grpSpPr>
+        <a:xfrm>
+          <a:off x="0" y="0"/>
+          <a:ext cx="0" cy="0"/>
+          <a:chOff x="0" y="0"/>
+          <a:chExt cx="0" cy="0"/>
+        </a:xfrm>
+      </p:grpSpPr>
+      <p:sp>
+        <p:nvSpPr>
+          <p:cNvPr id="3" name="Inhaltsplatzhalter 2">
+            <a:extLst>
+              <a:ext uri="{FF2B5EF4-FFF2-40B4-BE49-F238E27FC236}">
+                <a16:creationId xmlns:a16="http://schemas.microsoft.com/office/drawing/2014/main" id="{2E6429AE-1593-4842-86AE-D92C0ED8B22D}"/>
+              </a:ext>
+            </a:extLst>
+          </p:cNvPr>
+          <p:cNvSpPr>
+            <a:spLocks noGrp="1"/>
+          </p:cNvSpPr>
+          <p:nvPr>
+            <p:ph idx="1"/>
+          </p:nvPr>
+        </p:nvSpPr>
+        <p:spPr>
+          <a:xfrm>
+            <a:off x="838200" y="1825624"/>
+            <a:ext cx="10515600" cy="4879975"/>
+          </a:xfrm>
+        </p:spPr>
+        <p:txBody>
+          <a:bodyPr>
+            <a:normAutofit/>
+          </a:bodyPr>
+          <a:lstStyle/>
+          <a:p>
+            <a:r>
+              <a:rPr lang="de-DE" sz="2400" dirty="0"/>
+              <a:t>Rechtklick auf Docker Desktop Icon</a:t>
+            </a:r>
+          </a:p>
+          <a:p>
+            <a:r>
+              <a:rPr lang="de-DE" sz="2400" dirty="0"/>
+              <a:t>Settings wählen</a:t>
+            </a:r>
+          </a:p>
+          <a:p>
+            <a:r>
+              <a:rPr lang="de-DE" sz="2400" dirty="0"/>
+              <a:t>Haken bei C setzen</a:t>
+            </a:r>
+          </a:p>
+          <a:p>
+            <a:endParaRPr lang="de-DE" sz="2400" dirty="0"/>
+          </a:p>
+          <a:p>
+            <a:endParaRPr lang="de-DE" sz="2400" dirty="0"/>
+          </a:p>
+        </p:txBody>
+      </p:sp>
+      <p:sp>
+        <p:nvSpPr>
+          <p:cNvPr id="2" name="Titel 1">
+            <a:extLst>
+              <a:ext uri="{FF2B5EF4-FFF2-40B4-BE49-F238E27FC236}">
+                <a16:creationId xmlns:a16="http://schemas.microsoft.com/office/drawing/2014/main" id="{DB8D5029-1223-4C9E-9BB1-52F91CFADFA1}"/>
+              </a:ext>
+            </a:extLst>
+          </p:cNvPr>
+          <p:cNvSpPr>
+            <a:spLocks noGrp="1"/>
+          </p:cNvSpPr>
+          <p:nvPr>
+            <p:ph type="title"/>
+          </p:nvPr>
+        </p:nvSpPr>
+        <p:spPr/>
+        <p:txBody>
+          <a:bodyPr/>
+          <a:lstStyle/>
+          <a:p>
+            <a:pPr lvl="0"/>
+            <a:r>
+              <a:rPr lang="de-DE" dirty="0"/>
+              <a:t>Docker </a:t>
+            </a:r>
+            <a:r>
+              <a:rPr lang="de-DE" dirty="0" err="1"/>
+              <a:t>Shared</a:t>
+            </a:r>
+            <a:r>
+              <a:rPr lang="de-DE" dirty="0"/>
+              <a:t> Drives</a:t>
+            </a:r>
+            <a:endParaRPr lang="en-US" dirty="0"/>
+          </a:p>
+        </p:txBody>
+      </p:sp>
+      <p:grpSp>
+        <p:nvGrpSpPr>
+          <p:cNvPr id="14" name="Gruppieren 13">
+            <a:extLst>
+              <a:ext uri="{FF2B5EF4-FFF2-40B4-BE49-F238E27FC236}">
+                <a16:creationId xmlns:a16="http://schemas.microsoft.com/office/drawing/2014/main" id="{A7E90F94-D149-4F1F-BC7E-15AD24AE91F1}"/>
+              </a:ext>
+            </a:extLst>
+          </p:cNvPr>
+          <p:cNvGrpSpPr/>
+          <p:nvPr/>
+        </p:nvGrpSpPr>
+        <p:grpSpPr>
+          <a:xfrm>
+            <a:off x="6096001" y="1106423"/>
+            <a:ext cx="2426884" cy="1717739"/>
+            <a:chOff x="7782647" y="1027906"/>
+            <a:chExt cx="3202829" cy="2266950"/>
+          </a:xfrm>
+        </p:grpSpPr>
+        <p:grpSp>
+          <p:nvGrpSpPr>
+            <p:cNvPr id="8" name="Gruppieren 7">
+              <a:extLst>
+                <a:ext uri="{FF2B5EF4-FFF2-40B4-BE49-F238E27FC236}">
+                  <a16:creationId xmlns:a16="http://schemas.microsoft.com/office/drawing/2014/main" id="{669D70BB-8F03-49D6-9261-33CD61233827}"/>
+                </a:ext>
+              </a:extLst>
+            </p:cNvPr>
+            <p:cNvGrpSpPr/>
+            <p:nvPr/>
+          </p:nvGrpSpPr>
+          <p:grpSpPr>
+            <a:xfrm>
+              <a:off x="7909766" y="1027906"/>
+              <a:ext cx="3075710" cy="2266950"/>
+              <a:chOff x="7909766" y="1027906"/>
+              <a:chExt cx="3075710" cy="2266950"/>
+            </a:xfrm>
+          </p:grpSpPr>
+          <p:pic>
+            <p:nvPicPr>
+              <p:cNvPr id="4" name="Grafik 3">
+                <a:extLst>
+                  <a:ext uri="{FF2B5EF4-FFF2-40B4-BE49-F238E27FC236}">
+                    <a16:creationId xmlns:a16="http://schemas.microsoft.com/office/drawing/2014/main" id="{63C89446-E452-4F50-8364-3E43A0A1B5B1}"/>
+                  </a:ext>
+                </a:extLst>
+              </p:cNvPr>
+              <p:cNvPicPr>
+                <a:picLocks noChangeAspect="1"/>
+              </p:cNvPicPr>
+              <p:nvPr/>
+            </p:nvPicPr>
+            <p:blipFill>
+              <a:blip r:embed="rId2"/>
+              <a:stretch>
+                <a:fillRect/>
+              </a:stretch>
+            </p:blipFill>
+            <p:spPr>
+              <a:xfrm>
+                <a:off x="7909766" y="1027906"/>
+                <a:ext cx="2762250" cy="2266950"/>
+              </a:xfrm>
+              <a:prstGeom prst="rect">
+                <a:avLst/>
+              </a:prstGeom>
+            </p:spPr>
+          </p:pic>
+          <p:sp>
+            <p:nvSpPr>
+              <p:cNvPr id="6" name="Rechteck 5">
+                <a:extLst>
+                  <a:ext uri="{FF2B5EF4-FFF2-40B4-BE49-F238E27FC236}">
+                    <a16:creationId xmlns:a16="http://schemas.microsoft.com/office/drawing/2014/main" id="{103F2249-CB60-487F-AC43-B44D4FF14292}"/>
+                  </a:ext>
+                </a:extLst>
+              </p:cNvPr>
+              <p:cNvSpPr/>
+              <p:nvPr/>
+            </p:nvSpPr>
+            <p:spPr>
+              <a:xfrm>
+                <a:off x="9806671" y="1027906"/>
+                <a:ext cx="1178805" cy="1872867"/>
+              </a:xfrm>
+              <a:prstGeom prst="rect">
+                <a:avLst/>
+              </a:prstGeom>
+              <a:solidFill>
+                <a:schemeClr val="bg1"/>
+              </a:solidFill>
+              <a:ln>
+                <a:noFill/>
+              </a:ln>
+            </p:spPr>
+            <p:style>
+              <a:lnRef idx="2">
+                <a:schemeClr val="accent1">
+                  <a:shade val="50000"/>
+                </a:schemeClr>
+              </a:lnRef>
+              <a:fillRef idx="1">
+                <a:schemeClr val="accent1"/>
+              </a:fillRef>
+              <a:effectRef idx="0">
+                <a:schemeClr val="accent1"/>
+              </a:effectRef>
+              <a:fontRef idx="minor">
+                <a:schemeClr val="lt1"/>
+              </a:fontRef>
+            </p:style>
+            <p:txBody>
+              <a:bodyPr rtlCol="0" anchor="ctr"/>
+              <a:lstStyle/>
+              <a:p>
+                <a:pPr algn="ctr"/>
+                <a:endParaRPr lang="en-US"/>
+              </a:p>
+            </p:txBody>
+          </p:sp>
+        </p:grpSp>
+        <p:sp>
+          <p:nvSpPr>
+            <p:cNvPr id="12" name="Rechteck: abgerundete Ecken 11">
+              <a:extLst>
+                <a:ext uri="{FF2B5EF4-FFF2-40B4-BE49-F238E27FC236}">
+                  <a16:creationId xmlns:a16="http://schemas.microsoft.com/office/drawing/2014/main" id="{95D1519A-3208-48C6-8843-C168BC55E509}"/>
+                </a:ext>
+              </a:extLst>
+            </p:cNvPr>
+            <p:cNvSpPr/>
+            <p:nvPr/>
+          </p:nvSpPr>
+          <p:spPr>
+            <a:xfrm>
+              <a:off x="7782647" y="2495131"/>
+              <a:ext cx="574970" cy="405642"/>
+            </a:xfrm>
+            <a:prstGeom prst="roundRect">
+              <a:avLst/>
+            </a:prstGeom>
+            <a:noFill/>
+            <a:ln w="38100">
+              <a:solidFill>
+                <a:srgbClr val="FF0000"/>
+              </a:solidFill>
+            </a:ln>
+          </p:spPr>
+          <p:style>
+            <a:lnRef idx="2">
+              <a:schemeClr val="accent1">
+                <a:shade val="50000"/>
+              </a:schemeClr>
+            </a:lnRef>
+            <a:fillRef idx="1">
+              <a:schemeClr val="accent1"/>
+            </a:fillRef>
+            <a:effectRef idx="0">
+              <a:schemeClr val="accent1"/>
+            </a:effectRef>
+            <a:fontRef idx="minor">
+              <a:schemeClr val="lt1"/>
+            </a:fontRef>
+          </p:style>
+          <p:txBody>
+            <a:bodyPr rtlCol="0" anchor="ctr"/>
+            <a:lstStyle/>
+            <a:p>
+              <a:pPr algn="ctr"/>
+              <a:endParaRPr lang="en-US"/>
+            </a:p>
+          </p:txBody>
+        </p:sp>
+      </p:grpSp>
+      <p:pic>
+        <p:nvPicPr>
+          <p:cNvPr id="13" name="Grafik 12">
+            <a:extLst>
+              <a:ext uri="{FF2B5EF4-FFF2-40B4-BE49-F238E27FC236}">
+                <a16:creationId xmlns:a16="http://schemas.microsoft.com/office/drawing/2014/main" id="{84507E93-9069-499B-AB32-1407E036AAF2}"/>
+              </a:ext>
+            </a:extLst>
+          </p:cNvPr>
+          <p:cNvPicPr>
+            <a:picLocks noChangeAspect="1"/>
+          </p:cNvPicPr>
+          <p:nvPr/>
+        </p:nvPicPr>
+        <p:blipFill rotWithShape="1">
+          <a:blip r:embed="rId3"/>
+          <a:srcRect t="-1008" b="1668"/>
+          <a:stretch/>
+        </p:blipFill>
+        <p:spPr>
+          <a:xfrm>
+            <a:off x="1192198" y="3216723"/>
+            <a:ext cx="6729330" cy="3375659"/>
+          </a:xfrm>
+          <a:prstGeom prst="rect">
+            <a:avLst/>
+          </a:prstGeom>
+        </p:spPr>
+      </p:pic>
+      <p:sp>
+        <p:nvSpPr>
+          <p:cNvPr id="15" name="Rechteck: abgerundete Ecken 14">
+            <a:extLst>
+              <a:ext uri="{FF2B5EF4-FFF2-40B4-BE49-F238E27FC236}">
+                <a16:creationId xmlns:a16="http://schemas.microsoft.com/office/drawing/2014/main" id="{B373BA92-BFCA-43FF-A396-D3B82A7A808E}"/>
+              </a:ext>
+            </a:extLst>
+          </p:cNvPr>
+          <p:cNvSpPr/>
+          <p:nvPr/>
+        </p:nvSpPr>
+        <p:spPr>
+          <a:xfrm>
+            <a:off x="3319272" y="4904552"/>
+            <a:ext cx="274130" cy="254793"/>
+          </a:xfrm>
+          <a:prstGeom prst="roundRect">
+            <a:avLst/>
+          </a:prstGeom>
+          <a:noFill/>
+          <a:ln w="38100">
+            <a:solidFill>
+              <a:srgbClr val="FF0000"/>
+            </a:solidFill>
+          </a:ln>
+        </p:spPr>
+        <p:style>
+          <a:lnRef idx="2">
+            <a:schemeClr val="accent1">
+              <a:shade val="50000"/>
+            </a:schemeClr>
+          </a:lnRef>
+          <a:fillRef idx="1">
+            <a:schemeClr val="accent1"/>
+          </a:fillRef>
+          <a:effectRef idx="0">
+            <a:schemeClr val="accent1"/>
+          </a:effectRef>
+          <a:fontRef idx="minor">
+            <a:schemeClr val="lt1"/>
+          </a:fontRef>
+        </p:style>
+        <p:txBody>
+          <a:bodyPr rtlCol="0" anchor="ctr"/>
+          <a:lstStyle/>
+          <a:p>
+            <a:pPr algn="ctr"/>
+            <a:endParaRPr lang="en-US" dirty="0"/>
+          </a:p>
+        </p:txBody>
+      </p:sp>
+    </p:spTree>
+    <p:extLst>
+      <p:ext uri="{BB962C8B-B14F-4D97-AF65-F5344CB8AC3E}">
+        <p14:creationId xmlns:p14="http://schemas.microsoft.com/office/powerpoint/2010/main" val="2302762850"/>
+      </p:ext>
+    </p:extLst>
+  </p:cSld>
+  <p:clrMapOvr>
+    <a:masterClrMapping/>
+  </p:clrMapOvr>
+</p:sld>
+</file>
+
+<file path=ppt/slides/slide36.xml><?xml version="1.0" encoding="utf-8"?>
+<p:sld xmlns:a="http://schemas.openxmlformats.org/drawingml/2006/main" xmlns:r="http://schemas.openxmlformats.org/officeDocument/2006/relationships" xmlns:p="http://schemas.openxmlformats.org/presentationml/2006/main">
+  <p:cSld>
+    <p:spTree>
+      <p:nvGrpSpPr>
+        <p:cNvPr id="1" name=""/>
+        <p:cNvGrpSpPr/>
+        <p:nvPr/>
+      </p:nvGrpSpPr>
+      <p:grpSpPr>
+        <a:xfrm>
+          <a:off x="0" y="0"/>
+          <a:ext cx="0" cy="0"/>
+          <a:chOff x="0" y="0"/>
+          <a:chExt cx="0" cy="0"/>
+        </a:xfrm>
+      </p:grpSpPr>
+      <p:sp>
+        <p:nvSpPr>
+          <p:cNvPr id="3" name="Inhaltsplatzhalter 2">
+            <a:extLst>
+              <a:ext uri="{FF2B5EF4-FFF2-40B4-BE49-F238E27FC236}">
+                <a16:creationId xmlns:a16="http://schemas.microsoft.com/office/drawing/2014/main" id="{2E6429AE-1593-4842-86AE-D92C0ED8B22D}"/>
+              </a:ext>
+            </a:extLst>
+          </p:cNvPr>
+          <p:cNvSpPr>
+            <a:spLocks noGrp="1"/>
+          </p:cNvSpPr>
+          <p:nvPr>
+            <p:ph idx="1"/>
+          </p:nvPr>
+        </p:nvSpPr>
+        <p:spPr>
+          <a:xfrm>
+            <a:off x="838200" y="1825624"/>
+            <a:ext cx="10515600" cy="4879975"/>
+          </a:xfrm>
+        </p:spPr>
+        <p:txBody>
+          <a:bodyPr>
+            <a:normAutofit/>
+          </a:bodyPr>
+          <a:lstStyle/>
+          <a:p>
+            <a:r>
+              <a:rPr lang="de-DE" sz="2400" dirty="0"/>
+              <a:t>Taskmanager als Admin ausführen</a:t>
+            </a:r>
+          </a:p>
+          <a:p>
+            <a:r>
+              <a:rPr lang="de-DE" sz="2400" dirty="0"/>
+              <a:t>Im Reiter Dienste „Docker Desktop“</a:t>
+            </a:r>
+          </a:p>
+          <a:p>
+            <a:r>
+              <a:rPr lang="de-DE" sz="2400" dirty="0" err="1"/>
+              <a:t>Rechstklick</a:t>
+            </a:r>
+            <a:endParaRPr lang="de-DE" sz="2400" dirty="0"/>
+          </a:p>
+          <a:p>
+            <a:r>
+              <a:rPr lang="de-DE" sz="2400" dirty="0"/>
+              <a:t>Neu starten</a:t>
+            </a:r>
+          </a:p>
+          <a:p>
+            <a:endParaRPr lang="de-DE" sz="2400" dirty="0"/>
+          </a:p>
+          <a:p>
+            <a:endParaRPr lang="de-DE" sz="2400" dirty="0"/>
+          </a:p>
+        </p:txBody>
+      </p:sp>
+      <p:sp>
+        <p:nvSpPr>
+          <p:cNvPr id="2" name="Titel 1">
+            <a:extLst>
+              <a:ext uri="{FF2B5EF4-FFF2-40B4-BE49-F238E27FC236}">
+                <a16:creationId xmlns:a16="http://schemas.microsoft.com/office/drawing/2014/main" id="{DB8D5029-1223-4C9E-9BB1-52F91CFADFA1}"/>
+              </a:ext>
+            </a:extLst>
+          </p:cNvPr>
+          <p:cNvSpPr>
+            <a:spLocks noGrp="1"/>
+          </p:cNvSpPr>
+          <p:nvPr>
+            <p:ph type="title"/>
+          </p:nvPr>
+        </p:nvSpPr>
+        <p:spPr/>
+        <p:txBody>
+          <a:bodyPr/>
+          <a:lstStyle/>
+          <a:p>
+            <a:pPr lvl="0"/>
+            <a:r>
+              <a:rPr lang="de-DE" dirty="0"/>
+              <a:t>Docker Restart Service</a:t>
+            </a:r>
+            <a:endParaRPr lang="en-US" dirty="0"/>
+          </a:p>
+        </p:txBody>
+      </p:sp>
+      <p:pic>
+        <p:nvPicPr>
+          <p:cNvPr id="5" name="Grafik 4">
+            <a:extLst>
+              <a:ext uri="{FF2B5EF4-FFF2-40B4-BE49-F238E27FC236}">
+                <a16:creationId xmlns:a16="http://schemas.microsoft.com/office/drawing/2014/main" id="{94A7E607-44BF-457E-9CC0-96544DBB85B7}"/>
+              </a:ext>
+            </a:extLst>
+          </p:cNvPr>
+          <p:cNvPicPr>
+            <a:picLocks noChangeAspect="1"/>
+          </p:cNvPicPr>
+          <p:nvPr/>
+        </p:nvPicPr>
+        <p:blipFill>
+          <a:blip r:embed="rId2"/>
+          <a:stretch>
+            <a:fillRect/>
+          </a:stretch>
+        </p:blipFill>
+        <p:spPr>
+          <a:xfrm>
+            <a:off x="5870899" y="1589102"/>
+            <a:ext cx="5333256" cy="4727205"/>
+          </a:xfrm>
+          <a:prstGeom prst="rect">
+            <a:avLst/>
+          </a:prstGeom>
+        </p:spPr>
+      </p:pic>
+      <p:sp>
+        <p:nvSpPr>
+          <p:cNvPr id="11" name="Rechteck: abgerundete Ecken 10">
+            <a:extLst>
+              <a:ext uri="{FF2B5EF4-FFF2-40B4-BE49-F238E27FC236}">
+                <a16:creationId xmlns:a16="http://schemas.microsoft.com/office/drawing/2014/main" id="{EAD309E9-E8CB-477C-9609-8BD921823CB4}"/>
+              </a:ext>
+            </a:extLst>
+          </p:cNvPr>
+          <p:cNvSpPr/>
+          <p:nvPr/>
+        </p:nvSpPr>
+        <p:spPr>
+          <a:xfrm>
+            <a:off x="8559561" y="5215231"/>
+            <a:ext cx="1124266" cy="151401"/>
+          </a:xfrm>
+          <a:prstGeom prst="roundRect">
+            <a:avLst/>
+          </a:prstGeom>
+          <a:noFill/>
+          <a:ln w="38100">
+            <a:solidFill>
+              <a:srgbClr val="FF0000"/>
+            </a:solidFill>
+          </a:ln>
+        </p:spPr>
+        <p:style>
+          <a:lnRef idx="2">
+            <a:schemeClr val="accent1">
+              <a:shade val="50000"/>
+            </a:schemeClr>
+          </a:lnRef>
+          <a:fillRef idx="1">
+            <a:schemeClr val="accent1"/>
+          </a:fillRef>
+          <a:effectRef idx="0">
+            <a:schemeClr val="accent1"/>
+          </a:effectRef>
+          <a:fontRef idx="minor">
+            <a:schemeClr val="lt1"/>
+          </a:fontRef>
+        </p:style>
+        <p:txBody>
+          <a:bodyPr rtlCol="0" anchor="ctr"/>
+          <a:lstStyle/>
+          <a:p>
+            <a:pPr algn="ctr"/>
+            <a:endParaRPr lang="en-US" dirty="0"/>
+          </a:p>
+        </p:txBody>
+      </p:sp>
+    </p:spTree>
+    <p:extLst>
+      <p:ext uri="{BB962C8B-B14F-4D97-AF65-F5344CB8AC3E}">
+        <p14:creationId xmlns:p14="http://schemas.microsoft.com/office/powerpoint/2010/main" val="48315896"/>
+      </p:ext>
+    </p:extLst>
+  </p:cSld>
+  <p:clrMapOvr>
+    <a:masterClrMapping/>
+  </p:clrMapOvr>
+</p:sld>
+</file>
+
 <file path=ppt/slides/slide4.xml><?xml version="1.0" encoding="utf-8"?>
 <p:sld xmlns:a="http://schemas.openxmlformats.org/drawingml/2006/main" xmlns:r="http://schemas.openxmlformats.org/officeDocument/2006/relationships" xmlns:p="http://schemas.openxmlformats.org/presentationml/2006/main">
   <p:cSld>

</xml_diff>

<commit_message>
Add random seed Some tuning
</commit_message>
<xml_diff>
--- a/handson_workshop.pptx
+++ b/handson_workshop.pptx
@@ -14381,7 +14381,7 @@
         </p:spPr>
         <p:txBody>
           <a:bodyPr>
-            <a:normAutofit/>
+            <a:normAutofit lnSpcReduction="10000"/>
           </a:bodyPr>
           <a:lstStyle/>
           <a:p>
@@ -14396,6 +14396,38 @@
                 <a:latin typeface="Consolas" panose="020B0609020204030204" pitchFamily="49" charset="0"/>
               </a:rPr>
               <a:t># 6. split into training and test data</a:t>
+            </a:r>
+          </a:p>
+          <a:p>
+            <a:pPr marL="0" indent="0">
+              <a:buNone/>
+            </a:pPr>
+            <a:r>
+              <a:rPr lang="en-US" sz="2400" dirty="0" err="1">
+                <a:latin typeface="Consolas" panose="020B0609020204030204" pitchFamily="49" charset="0"/>
+              </a:rPr>
+              <a:t>set.seed</a:t>
+            </a:r>
+            <a:r>
+              <a:rPr lang="en-US" sz="2400" dirty="0">
+                <a:latin typeface="Consolas" panose="020B0609020204030204" pitchFamily="49" charset="0"/>
+              </a:rPr>
+              <a:t>(</a:t>
+            </a:r>
+            <a:r>
+              <a:rPr lang="en-US" sz="2400" dirty="0">
+                <a:solidFill>
+                  <a:srgbClr val="0070C0"/>
+                </a:solidFill>
+                <a:latin typeface="Consolas" panose="020B0609020204030204" pitchFamily="49" charset="0"/>
+              </a:rPr>
+              <a:t>42</a:t>
+            </a:r>
+            <a:r>
+              <a:rPr lang="en-US" sz="2400" dirty="0">
+                <a:latin typeface="Consolas" panose="020B0609020204030204" pitchFamily="49" charset="0"/>
+              </a:rPr>
+              <a:t>)</a:t>
             </a:r>
           </a:p>
           <a:p>
@@ -14645,8 +14677,8 @@
           </a:xfrm>
           <a:prstGeom prst="wedgeRectCallout">
             <a:avLst>
-              <a:gd name="adj1" fmla="val -274758"/>
-              <a:gd name="adj2" fmla="val -51633"/>
+              <a:gd name="adj1" fmla="val -292061"/>
+              <a:gd name="adj2" fmla="val -24940"/>
             </a:avLst>
           </a:prstGeom>
         </p:spPr>
@@ -14704,6 +14736,81 @@
             <a:r>
               <a:rPr lang="de-DE" sz="2000" dirty="0" err="1"/>
               <a:t>data</a:t>
+            </a:r>
+            <a:endParaRPr lang="en-US" sz="2000" dirty="0"/>
+          </a:p>
+        </p:txBody>
+      </p:sp>
+      <p:sp>
+        <p:nvSpPr>
+          <p:cNvPr id="5" name="Sprechblase: rechteckig 4">
+            <a:extLst>
+              <a:ext uri="{FF2B5EF4-FFF2-40B4-BE49-F238E27FC236}">
+                <a16:creationId xmlns:a16="http://schemas.microsoft.com/office/drawing/2014/main" id="{802E059E-CB7F-429E-A755-9B54E8B04928}"/>
+              </a:ext>
+            </a:extLst>
+          </p:cNvPr>
+          <p:cNvSpPr/>
+          <p:nvPr/>
+        </p:nvSpPr>
+        <p:spPr>
+          <a:xfrm>
+            <a:off x="7924800" y="2030186"/>
+            <a:ext cx="2278742" cy="1194253"/>
+          </a:xfrm>
+          <a:prstGeom prst="wedgeRectCallout">
+            <a:avLst>
+              <a:gd name="adj1" fmla="val -260033"/>
+              <a:gd name="adj2" fmla="val -19320"/>
+            </a:avLst>
+          </a:prstGeom>
+        </p:spPr>
+        <p:style>
+          <a:lnRef idx="2">
+            <a:schemeClr val="dk1"/>
+          </a:lnRef>
+          <a:fillRef idx="1">
+            <a:schemeClr val="lt1"/>
+          </a:fillRef>
+          <a:effectRef idx="0">
+            <a:schemeClr val="dk1"/>
+          </a:effectRef>
+          <a:fontRef idx="minor">
+            <a:schemeClr val="dk1"/>
+          </a:fontRef>
+        </p:style>
+        <p:txBody>
+          <a:bodyPr rtlCol="0" anchor="ctr"/>
+          <a:lstStyle/>
+          <a:p>
+            <a:pPr algn="ctr"/>
+            <a:r>
+              <a:rPr lang="de-DE" sz="2000" dirty="0" err="1"/>
+              <a:t>set</a:t>
+            </a:r>
+            <a:r>
+              <a:rPr lang="de-DE" sz="2000" dirty="0"/>
+              <a:t> </a:t>
+            </a:r>
+            <a:r>
+              <a:rPr lang="de-DE" sz="2000" dirty="0" err="1"/>
+              <a:t>random</a:t>
+            </a:r>
+            <a:r>
+              <a:rPr lang="de-DE" sz="2000" dirty="0"/>
+              <a:t> seed </a:t>
+            </a:r>
+            <a:r>
+              <a:rPr lang="de-DE" sz="2000" dirty="0" err="1"/>
+              <a:t>for</a:t>
+            </a:r>
+            <a:r>
+              <a:rPr lang="de-DE" sz="2000" dirty="0"/>
+              <a:t> </a:t>
+            </a:r>
+            <a:r>
+              <a:rPr lang="de-DE" sz="2000" dirty="0" err="1"/>
+              <a:t>reproduceability</a:t>
             </a:r>
             <a:endParaRPr lang="en-US" sz="2000" dirty="0"/>
           </a:p>
@@ -21505,6 +21612,75 @@
       </p:grpSpPr>
       <p:sp>
         <p:nvSpPr>
+          <p:cNvPr id="6" name="Sprechblase: rechteckig 5">
+            <a:extLst>
+              <a:ext uri="{FF2B5EF4-FFF2-40B4-BE49-F238E27FC236}">
+                <a16:creationId xmlns:a16="http://schemas.microsoft.com/office/drawing/2014/main" id="{102F432C-B05F-4257-9E38-9E454CC53B9B}"/>
+              </a:ext>
+            </a:extLst>
+          </p:cNvPr>
+          <p:cNvSpPr/>
+          <p:nvPr/>
+        </p:nvSpPr>
+        <p:spPr>
+          <a:xfrm>
+            <a:off x="9521370" y="1256226"/>
+            <a:ext cx="2278742" cy="658332"/>
+          </a:xfrm>
+          <a:prstGeom prst="wedgeRectCallout">
+            <a:avLst>
+              <a:gd name="adj1" fmla="val -100084"/>
+              <a:gd name="adj2" fmla="val 252237"/>
+            </a:avLst>
+          </a:prstGeom>
+        </p:spPr>
+        <p:style>
+          <a:lnRef idx="2">
+            <a:schemeClr val="dk1"/>
+          </a:lnRef>
+          <a:fillRef idx="1">
+            <a:schemeClr val="lt1"/>
+          </a:fillRef>
+          <a:effectRef idx="0">
+            <a:schemeClr val="dk1"/>
+          </a:effectRef>
+          <a:fontRef idx="minor">
+            <a:schemeClr val="dk1"/>
+          </a:fontRef>
+        </p:style>
+        <p:txBody>
+          <a:bodyPr rtlCol="0" anchor="ctr"/>
+          <a:lstStyle/>
+          <a:p>
+            <a:pPr algn="ctr"/>
+            <a:r>
+              <a:rPr lang="de-DE" sz="2000" dirty="0" err="1"/>
+              <a:t>print</a:t>
+            </a:r>
+            <a:r>
+              <a:rPr lang="de-DE" sz="2000" dirty="0"/>
+              <a:t> </a:t>
+            </a:r>
+            <a:r>
+              <a:rPr lang="de-DE" sz="2000" dirty="0" err="1"/>
+              <a:t>training</a:t>
+            </a:r>
+            <a:r>
+              <a:rPr lang="de-DE" sz="2000" dirty="0"/>
+              <a:t> </a:t>
+            </a:r>
+            <a:r>
+              <a:rPr lang="de-DE" sz="2000" dirty="0" err="1"/>
+              <a:t>progress</a:t>
+            </a:r>
+            <a:endParaRPr lang="en-US" sz="2000" dirty="0">
+              <a:latin typeface="Consolas" panose="020B0609020204030204" pitchFamily="49" charset="0"/>
+            </a:endParaRPr>
+          </a:p>
+        </p:txBody>
+      </p:sp>
+      <p:sp>
+        <p:nvSpPr>
           <p:cNvPr id="3" name="Inhaltsplatzhalter 2">
             <a:extLst>
               <a:ext uri="{FF2B5EF4-FFF2-40B4-BE49-F238E27FC236}">
@@ -21527,7 +21703,7 @@
         </p:spPr>
         <p:txBody>
           <a:bodyPr>
-            <a:normAutofit fontScale="92500" lnSpcReduction="10000"/>
+            <a:normAutofit fontScale="92500" lnSpcReduction="20000"/>
           </a:bodyPr>
           <a:lstStyle/>
           <a:p>
@@ -21616,6 +21792,44 @@
                 <a:latin typeface="Consolas" panose="020B0609020204030204" pitchFamily="49" charset="0"/>
               </a:rPr>
               <a:t>classProbs</a:t>
+            </a:r>
+            <a:r>
+              <a:rPr lang="en-US" sz="2400" dirty="0">
+                <a:latin typeface="Consolas" panose="020B0609020204030204" pitchFamily="49" charset="0"/>
+              </a:rPr>
+              <a:t> = </a:t>
+            </a:r>
+            <a:r>
+              <a:rPr lang="en-US" sz="2400" dirty="0">
+                <a:solidFill>
+                  <a:srgbClr val="0070C0"/>
+                </a:solidFill>
+                <a:latin typeface="Consolas" panose="020B0609020204030204" pitchFamily="49" charset="0"/>
+              </a:rPr>
+              <a:t>TRUE</a:t>
+            </a:r>
+            <a:r>
+              <a:rPr lang="en-US" sz="2400" dirty="0">
+                <a:latin typeface="Consolas" panose="020B0609020204030204" pitchFamily="49" charset="0"/>
+              </a:rPr>
+              <a:t>,</a:t>
+            </a:r>
+          </a:p>
+          <a:p>
+            <a:pPr marL="0" indent="0">
+              <a:buNone/>
+            </a:pPr>
+            <a:r>
+              <a:rPr lang="en-US" sz="2400" dirty="0">
+                <a:latin typeface="Consolas" panose="020B0609020204030204" pitchFamily="49" charset="0"/>
+              </a:rPr>
+              <a:t>					</a:t>
+            </a:r>
+            <a:r>
+              <a:rPr lang="en-US" sz="2400" dirty="0" err="1">
+                <a:latin typeface="Consolas" panose="020B0609020204030204" pitchFamily="49" charset="0"/>
+              </a:rPr>
+              <a:t>verboseIter</a:t>
             </a:r>
             <a:r>
               <a:rPr lang="en-US" sz="2400" dirty="0">
@@ -22200,13 +22414,13 @@
         </p:nvSpPr>
         <p:spPr>
           <a:xfrm>
-            <a:off x="9521370" y="365125"/>
-            <a:ext cx="2278742" cy="1429655"/>
+            <a:off x="9521370" y="365126"/>
+            <a:ext cx="2278742" cy="658332"/>
           </a:xfrm>
           <a:prstGeom prst="wedgeRectCallout">
             <a:avLst>
-              <a:gd name="adj1" fmla="val -129535"/>
-              <a:gd name="adj2" fmla="val 85306"/>
+              <a:gd name="adj1" fmla="val -131376"/>
+              <a:gd name="adj2" fmla="val 230574"/>
             </a:avLst>
           </a:prstGeom>
         </p:spPr>
@@ -22795,7 +23009,7 @@
                 </a:solidFill>
                 <a:latin typeface="Consolas" panose="020B0609020204030204" pitchFamily="49" charset="0"/>
               </a:rPr>
-              <a:t> = 30, </a:t>
+              <a:t> = 50, </a:t>
             </a:r>
             <a:r>
               <a:rPr lang="en-US" sz="2400" dirty="0" err="1">
@@ -22813,7 +23027,7 @@
                 </a:solidFill>
                 <a:latin typeface="Consolas" panose="020B0609020204030204" pitchFamily="49" charset="0"/>
               </a:rPr>
-              <a:t> = 3, eta = 0.1,</a:t>
+              <a:t> = 4, eta = 0.09,</a:t>
             </a:r>
           </a:p>
           <a:p>
@@ -22827,7 +23041,7 @@
                 </a:solidFill>
                 <a:latin typeface="Consolas" panose="020B0609020204030204" pitchFamily="49" charset="0"/>
               </a:rPr>
-              <a:t>&gt; gamma = 0.05, </a:t>
+              <a:t>&gt; gamma = 0.08, </a:t>
             </a:r>
             <a:r>
               <a:rPr lang="en-US" sz="2400" dirty="0" err="1">
@@ -22877,7 +23091,7 @@
                 </a:solidFill>
                 <a:latin typeface="Consolas" panose="020B0609020204030204" pitchFamily="49" charset="0"/>
               </a:rPr>
-              <a:t> = 1.5, subsample = 0.7 on full training set</a:t>
+              <a:t> = 0.85, subsample = 0.7 on full training set</a:t>
             </a:r>
           </a:p>
         </p:txBody>
@@ -24162,7 +24376,7 @@
                 </a:solidFill>
                 <a:latin typeface="Consolas" panose="020B0609020204030204" pitchFamily="49" charset="0"/>
               </a:rPr>
-              <a:t>&gt; [1] "precision: 0.899  |  recall: 0.692 |  F1: 0.782  |  accuracy: 0.869"</a:t>
+              <a:t>&gt; [1] "precision: 0.821  |  recall: 0.761  |  F1: 0.79  |  accuracy: 0.863"</a:t>
             </a:r>
           </a:p>
           <a:p>
@@ -24241,7 +24455,7 @@
                 </a:solidFill>
                 <a:latin typeface="Consolas" panose="020B0609020204030204" pitchFamily="49" charset="0"/>
               </a:rPr>
-              <a:t>&gt; </a:t>
+              <a:t>&gt;</a:t>
             </a:r>
           </a:p>
           <a:p>
@@ -24255,7 +24469,7 @@
                 </a:solidFill>
                 <a:latin typeface="Consolas" panose="020B0609020204030204" pitchFamily="49" charset="0"/>
               </a:rPr>
-              <a:t>&gt;           Reference</a:t>
+              <a:t>&gt;          Reference</a:t>
             </a:r>
           </a:p>
           <a:p>
@@ -24283,7 +24497,7 @@
                 </a:solidFill>
                 <a:latin typeface="Consolas" panose="020B0609020204030204" pitchFamily="49" charset="0"/>
               </a:rPr>
-              <a:t>&gt;    OFFENSE     400    45</a:t>
+              <a:t>&gt;   OFFENSE     440    96</a:t>
             </a:r>
           </a:p>
           <a:p>
@@ -24297,7 +24511,7 @@
                 </a:solidFill>
                 <a:latin typeface="Consolas" panose="020B0609020204030204" pitchFamily="49" charset="0"/>
               </a:rPr>
-              <a:t>&gt;    OTHER       178  1085</a:t>
+              <a:t>&gt;   OTHER       138  1034</a:t>
             </a:r>
           </a:p>
           <a:p>
@@ -24311,7 +24525,7 @@
                 </a:solidFill>
                 <a:latin typeface="Consolas" panose="020B0609020204030204" pitchFamily="49" charset="0"/>
               </a:rPr>
-              <a:t>&gt;                                           </a:t>
+              <a:t>&gt;                                         </a:t>
             </a:r>
           </a:p>
           <a:p>
@@ -24325,7 +24539,7 @@
                 </a:solidFill>
                 <a:latin typeface="Consolas" panose="020B0609020204030204" pitchFamily="49" charset="0"/>
               </a:rPr>
-              <a:t>&gt;                Accuracy : 0.8694          </a:t>
+              <a:t>&gt;               Accuracy : 0.863          </a:t>
             </a:r>
           </a:p>
           <a:p>
@@ -24339,7 +24553,7 @@
                 </a:solidFill>
                 <a:latin typeface="Consolas" panose="020B0609020204030204" pitchFamily="49" charset="0"/>
               </a:rPr>
-              <a:t>&gt;                  95% CI : (0.8525, 0.8851)</a:t>
+              <a:t>&gt;                 95% CI : (0.8458, 0.879)</a:t>
             </a:r>
           </a:p>
           <a:p>
@@ -24353,7 +24567,7 @@
                 </a:solidFill>
                 <a:latin typeface="Consolas" panose="020B0609020204030204" pitchFamily="49" charset="0"/>
               </a:rPr>
-              <a:t>&gt;     No Information Rate : 0.6616          </a:t>
+              <a:t>&gt;    No Information Rate : 0.6616         </a:t>
             </a:r>
           </a:p>
           <a:p>
@@ -24795,7 +25009,7 @@
         </p:spPr>
         <p:txBody>
           <a:bodyPr>
-            <a:normAutofit fontScale="55000" lnSpcReduction="20000"/>
+            <a:normAutofit fontScale="47500" lnSpcReduction="20000"/>
           </a:bodyPr>
           <a:lstStyle/>
           <a:p>
@@ -24953,7 +25167,7 @@
                 </a:solidFill>
                 <a:latin typeface="Consolas" panose="020B0609020204030204" pitchFamily="49" charset="0"/>
               </a:rPr>
-              <a:t>    100.00000</a:t>
+              <a:t>      100.00000</a:t>
             </a:r>
           </a:p>
           <a:p>
@@ -24976,7 +25190,7 @@
                 </a:solidFill>
                 <a:latin typeface="Consolas" panose="020B0609020204030204" pitchFamily="49" charset="0"/>
               </a:rPr>
-              <a:t>max_positive_tfidf</a:t>
+              <a:t>min_negative_tfidf</a:t>
             </a:r>
             <a:r>
               <a:rPr lang="en-US" sz="2400" dirty="0">
@@ -24985,7 +25199,7 @@
                 </a:solidFill>
                 <a:latin typeface="Consolas" panose="020B0609020204030204" pitchFamily="49" charset="0"/>
               </a:rPr>
-              <a:t>     10.75399</a:t>
+              <a:t>       34.12760</a:t>
             </a:r>
           </a:p>
           <a:p>
@@ -25008,7 +25222,7 @@
                 </a:solidFill>
                 <a:latin typeface="Consolas" panose="020B0609020204030204" pitchFamily="49" charset="0"/>
               </a:rPr>
-              <a:t>min_positive_tfidf</a:t>
+              <a:t>max_positive_tfidf</a:t>
             </a:r>
             <a:r>
               <a:rPr lang="en-US" sz="2400" dirty="0">
@@ -25017,7 +25231,7 @@
                 </a:solidFill>
                 <a:latin typeface="Consolas" panose="020B0609020204030204" pitchFamily="49" charset="0"/>
               </a:rPr>
-              <a:t>      3.37196</a:t>
+              <a:t>       18.13497</a:t>
             </a:r>
           </a:p>
           <a:p>
@@ -25040,7 +25254,7 @@
                 </a:solidFill>
                 <a:latin typeface="Consolas" panose="020B0609020204030204" pitchFamily="49" charset="0"/>
               </a:rPr>
-              <a:t>min_negative_tfidf</a:t>
+              <a:t>min_positive_tfidf</a:t>
             </a:r>
             <a:r>
               <a:rPr lang="en-US" sz="2400" dirty="0">
@@ -25049,7 +25263,7 @@
                 </a:solidFill>
                 <a:latin typeface="Consolas" panose="020B0609020204030204" pitchFamily="49" charset="0"/>
               </a:rPr>
-              <a:t>      3.22499</a:t>
+              <a:t>        4.37938</a:t>
             </a:r>
           </a:p>
           <a:p>
@@ -25063,25 +25277,7 @@
                 </a:solidFill>
                 <a:latin typeface="Consolas" panose="020B0609020204030204" pitchFamily="49" charset="0"/>
               </a:rPr>
-              <a:t>&gt; </a:t>
-            </a:r>
-            <a:r>
-              <a:rPr lang="en-US" sz="2400" dirty="0" err="1">
-                <a:solidFill>
-                  <a:srgbClr val="C00000"/>
-                </a:solidFill>
-                <a:latin typeface="Consolas" panose="020B0609020204030204" pitchFamily="49" charset="0"/>
-              </a:rPr>
-              <a:t>avg_negative_tfidf</a:t>
-            </a:r>
-            <a:r>
-              <a:rPr lang="en-US" sz="2400" dirty="0">
-                <a:solidFill>
-                  <a:srgbClr val="C00000"/>
-                </a:solidFill>
-                <a:latin typeface="Consolas" panose="020B0609020204030204" pitchFamily="49" charset="0"/>
-              </a:rPr>
-              <a:t>      2.39212</a:t>
+              <a:t>&gt; chars                     1.00120</a:t>
             </a:r>
           </a:p>
           <a:p>
@@ -25104,7 +25300,7 @@
                 </a:solidFill>
                 <a:latin typeface="Consolas" panose="020B0609020204030204" pitchFamily="49" charset="0"/>
               </a:rPr>
-              <a:t>avg_tfidf</a:t>
+              <a:t>positive_count</a:t>
             </a:r>
             <a:r>
               <a:rPr lang="en-US" sz="2400" dirty="0">
@@ -25113,7 +25309,7 @@
                 </a:solidFill>
                 <a:latin typeface="Consolas" panose="020B0609020204030204" pitchFamily="49" charset="0"/>
               </a:rPr>
-              <a:t>               1.52565</a:t>
+              <a:t>            0.84348</a:t>
             </a:r>
           </a:p>
           <a:p>
@@ -25127,25 +25323,7 @@
                 </a:solidFill>
                 <a:latin typeface="Consolas" panose="020B0609020204030204" pitchFamily="49" charset="0"/>
               </a:rPr>
-              <a:t>&gt; </a:t>
-            </a:r>
-            <a:r>
-              <a:rPr lang="en-US" sz="2400" dirty="0" err="1">
-                <a:solidFill>
-                  <a:srgbClr val="C00000"/>
-                </a:solidFill>
-                <a:latin typeface="Consolas" panose="020B0609020204030204" pitchFamily="49" charset="0"/>
-              </a:rPr>
-              <a:t>avg_positive_tfidf</a:t>
-            </a:r>
-            <a:r>
-              <a:rPr lang="en-US" sz="2400" dirty="0">
-                <a:solidFill>
-                  <a:srgbClr val="C00000"/>
-                </a:solidFill>
-                <a:latin typeface="Consolas" panose="020B0609020204030204" pitchFamily="49" charset="0"/>
-              </a:rPr>
-              <a:t>      0.84138</a:t>
+              <a:t>&gt; mentions                  0.68921</a:t>
             </a:r>
           </a:p>
           <a:p>
@@ -25159,7 +25337,25 @@
                 </a:solidFill>
                 <a:latin typeface="Consolas" panose="020B0609020204030204" pitchFamily="49" charset="0"/>
               </a:rPr>
-              <a:t>&gt; chars                   0.63887</a:t>
+              <a:t>&gt; </a:t>
+            </a:r>
+            <a:r>
+              <a:rPr lang="en-US" sz="2400" dirty="0" err="1">
+                <a:solidFill>
+                  <a:srgbClr val="C00000"/>
+                </a:solidFill>
+                <a:latin typeface="Consolas" panose="020B0609020204030204" pitchFamily="49" charset="0"/>
+              </a:rPr>
+              <a:t>avg_chars_per_word</a:t>
+            </a:r>
+            <a:r>
+              <a:rPr lang="en-US" sz="2400" dirty="0">
+                <a:solidFill>
+                  <a:srgbClr val="C00000"/>
+                </a:solidFill>
+                <a:latin typeface="Consolas" panose="020B0609020204030204" pitchFamily="49" charset="0"/>
+              </a:rPr>
+              <a:t>        0.62555</a:t>
             </a:r>
           </a:p>
           <a:p>
@@ -25182,7 +25378,7 @@
                 </a:solidFill>
                 <a:latin typeface="Consolas" panose="020B0609020204030204" pitchFamily="49" charset="0"/>
               </a:rPr>
-              <a:t>positive_count</a:t>
+              <a:t>neutral_count</a:t>
             </a:r>
             <a:r>
               <a:rPr lang="en-US" sz="2400" dirty="0">
@@ -25191,7 +25387,7 @@
                 </a:solidFill>
                 <a:latin typeface="Consolas" panose="020B0609020204030204" pitchFamily="49" charset="0"/>
               </a:rPr>
-              <a:t>          0.25692</a:t>
+              <a:t>             0.49604</a:t>
             </a:r>
           </a:p>
           <a:p>
@@ -25205,7 +25401,25 @@
                 </a:solidFill>
                 <a:latin typeface="Consolas" panose="020B0609020204030204" pitchFamily="49" charset="0"/>
               </a:rPr>
-              <a:t>&gt; mentions                0.25413</a:t>
+              <a:t>&gt; </a:t>
+            </a:r>
+            <a:r>
+              <a:rPr lang="en-US" sz="2400" dirty="0" err="1">
+                <a:solidFill>
+                  <a:srgbClr val="C00000"/>
+                </a:solidFill>
+                <a:latin typeface="Consolas" panose="020B0609020204030204" pitchFamily="49" charset="0"/>
+              </a:rPr>
+              <a:t>negative_count</a:t>
+            </a:r>
+            <a:r>
+              <a:rPr lang="en-US" sz="2400" dirty="0">
+                <a:solidFill>
+                  <a:srgbClr val="C00000"/>
+                </a:solidFill>
+                <a:latin typeface="Consolas" panose="020B0609020204030204" pitchFamily="49" charset="0"/>
+              </a:rPr>
+              <a:t>            0.45081</a:t>
             </a:r>
           </a:p>
           <a:p>
@@ -25228,7 +25442,7 @@
                 </a:solidFill>
                 <a:latin typeface="Consolas" panose="020B0609020204030204" pitchFamily="49" charset="0"/>
               </a:rPr>
-              <a:t>negative_count</a:t>
+              <a:t>linebreaks</a:t>
             </a:r>
             <a:r>
               <a:rPr lang="en-US" sz="2400" dirty="0">
@@ -25237,7 +25451,7 @@
                 </a:solidFill>
                 <a:latin typeface="Consolas" panose="020B0609020204030204" pitchFamily="49" charset="0"/>
               </a:rPr>
-              <a:t>          0.18304</a:t>
+              <a:t>                0.27949</a:t>
             </a:r>
           </a:p>
           <a:p>
@@ -25260,7 +25474,7 @@
                 </a:solidFill>
                 <a:latin typeface="Consolas" panose="020B0609020204030204" pitchFamily="49" charset="0"/>
               </a:rPr>
-              <a:t>non_ascii</a:t>
+              <a:t>punctuation_marks</a:t>
             </a:r>
             <a:r>
               <a:rPr lang="en-US" sz="2400" dirty="0">
@@ -25269,7 +25483,53 @@
                 </a:solidFill>
                 <a:latin typeface="Consolas" panose="020B0609020204030204" pitchFamily="49" charset="0"/>
               </a:rPr>
-              <a:t>               0.11225</a:t>
+              <a:t>         0.25306</a:t>
+            </a:r>
+          </a:p>
+          <a:p>
+            <a:pPr marL="0" indent="0">
+              <a:buNone/>
+            </a:pPr>
+            <a:r>
+              <a:rPr lang="en-US" sz="2400" dirty="0">
+                <a:solidFill>
+                  <a:srgbClr val="C00000"/>
+                </a:solidFill>
+                <a:latin typeface="Consolas" panose="020B0609020204030204" pitchFamily="49" charset="0"/>
+              </a:rPr>
+              <a:t>&gt; words                     0.22123</a:t>
+            </a:r>
+          </a:p>
+          <a:p>
+            <a:pPr marL="0" indent="0">
+              <a:buNone/>
+            </a:pPr>
+            <a:r>
+              <a:rPr lang="en-US" sz="2400" dirty="0">
+                <a:solidFill>
+                  <a:srgbClr val="C00000"/>
+                </a:solidFill>
+                <a:latin typeface="Consolas" panose="020B0609020204030204" pitchFamily="49" charset="0"/>
+              </a:rPr>
+              <a:t>&gt; </a:t>
+            </a:r>
+            <a:r>
+              <a:rPr lang="en-US" sz="2400" dirty="0" err="1">
+                <a:solidFill>
+                  <a:srgbClr val="C00000"/>
+                </a:solidFill>
+                <a:latin typeface="Consolas" panose="020B0609020204030204" pitchFamily="49" charset="0"/>
+              </a:rPr>
+              <a:t>avg_positive_tfidf</a:t>
+            </a:r>
+            <a:r>
+              <a:rPr lang="en-US" sz="2400" dirty="0">
+                <a:solidFill>
+                  <a:srgbClr val="C00000"/>
+                </a:solidFill>
+                <a:latin typeface="Consolas" panose="020B0609020204030204" pitchFamily="49" charset="0"/>
+              </a:rPr>
+              <a:t>        0.20314</a:t>
             </a:r>
           </a:p>
         </p:txBody>
@@ -25455,8 +25715,8 @@
           </a:xfrm>
           <a:prstGeom prst="wedgeRectCallout">
             <a:avLst>
-              <a:gd name="adj1" fmla="val -342847"/>
-              <a:gd name="adj2" fmla="val -2134"/>
+              <a:gd name="adj1" fmla="val -354259"/>
+              <a:gd name="adj2" fmla="val -30945"/>
             </a:avLst>
           </a:prstGeom>
         </p:spPr>
@@ -25512,8 +25772,8 @@
           </a:xfrm>
           <a:prstGeom prst="wedgeRectCallout">
             <a:avLst>
-              <a:gd name="adj1" fmla="val -291307"/>
-              <a:gd name="adj2" fmla="val -69568"/>
+              <a:gd name="adj1" fmla="val -304192"/>
+              <a:gd name="adj2" fmla="val -74128"/>
             </a:avLst>
           </a:prstGeom>
         </p:spPr>

</xml_diff>